<commit_message>
site title and personal description
</commit_message>
<xml_diff>
--- a/downloads/Workshop3-Schroeder-Building-Data-Sharing-Infrastructures.pptx
+++ b/downloads/Workshop3-Schroeder-Building-Data-Sharing-Infrastructures.pptx
@@ -2,36 +2,36 @@
 <file path=ppt/presentation.xml><?xml version="1.0" encoding="utf-8"?>
 <p:presentation xmlns:a="http://schemas.openxmlformats.org/drawingml/2006/main" xmlns:r="http://schemas.openxmlformats.org/officeDocument/2006/relationships" xmlns:p="http://schemas.openxmlformats.org/presentationml/2006/main" saveSubsetFonts="1" autoCompressPictures="0">
   <p:sldMasterIdLst>
-    <p:sldMasterId id="2147483661" r:id="rId1"/>
+    <p:sldMasterId id="2147483661" r:id="rId4"/>
   </p:sldMasterIdLst>
   <p:notesMasterIdLst>
-    <p:notesMasterId r:id="rId26"/>
+    <p:notesMasterId r:id="rId29"/>
   </p:notesMasterIdLst>
   <p:sldIdLst>
-    <p:sldId id="256" r:id="rId2"/>
-    <p:sldId id="261" r:id="rId3"/>
-    <p:sldId id="285" r:id="rId4"/>
-    <p:sldId id="263" r:id="rId5"/>
-    <p:sldId id="257" r:id="rId6"/>
-    <p:sldId id="259" r:id="rId7"/>
-    <p:sldId id="260" r:id="rId8"/>
-    <p:sldId id="266" r:id="rId9"/>
-    <p:sldId id="268" r:id="rId10"/>
-    <p:sldId id="270" r:id="rId11"/>
-    <p:sldId id="265" r:id="rId12"/>
-    <p:sldId id="262" r:id="rId13"/>
-    <p:sldId id="272" r:id="rId14"/>
-    <p:sldId id="274" r:id="rId15"/>
-    <p:sldId id="275" r:id="rId16"/>
-    <p:sldId id="277" r:id="rId17"/>
-    <p:sldId id="278" r:id="rId18"/>
-    <p:sldId id="279" r:id="rId19"/>
-    <p:sldId id="281" r:id="rId20"/>
-    <p:sldId id="283" r:id="rId21"/>
-    <p:sldId id="284" r:id="rId22"/>
-    <p:sldId id="287" r:id="rId23"/>
-    <p:sldId id="264" r:id="rId24"/>
-    <p:sldId id="288" r:id="rId25"/>
+    <p:sldId id="256" r:id="rId5"/>
+    <p:sldId id="261" r:id="rId6"/>
+    <p:sldId id="285" r:id="rId7"/>
+    <p:sldId id="263" r:id="rId8"/>
+    <p:sldId id="257" r:id="rId9"/>
+    <p:sldId id="259" r:id="rId10"/>
+    <p:sldId id="260" r:id="rId11"/>
+    <p:sldId id="266" r:id="rId12"/>
+    <p:sldId id="268" r:id="rId13"/>
+    <p:sldId id="270" r:id="rId14"/>
+    <p:sldId id="265" r:id="rId15"/>
+    <p:sldId id="262" r:id="rId16"/>
+    <p:sldId id="272" r:id="rId17"/>
+    <p:sldId id="274" r:id="rId18"/>
+    <p:sldId id="275" r:id="rId19"/>
+    <p:sldId id="277" r:id="rId20"/>
+    <p:sldId id="278" r:id="rId21"/>
+    <p:sldId id="279" r:id="rId22"/>
+    <p:sldId id="281" r:id="rId23"/>
+    <p:sldId id="283" r:id="rId24"/>
+    <p:sldId id="284" r:id="rId25"/>
+    <p:sldId id="287" r:id="rId26"/>
+    <p:sldId id="264" r:id="rId27"/>
+    <p:sldId id="288" r:id="rId28"/>
   </p:sldIdLst>
   <p:sldSz cx="9144000" cy="6858000" type="screen4x3"/>
   <p:notesSz cx="6858000" cy="9144000"/>
@@ -231,7 +231,7 @@
           <a:p>
             <a:fld id="{BF405CFC-861B-0C46-A385-9F6D770C0D3F}" type="datetimeFigureOut">
               <a:rPr lang="en-US" smtClean="0"/>
-              <a:t>11/17/2014</a:t>
+              <a:t>6/1/17</a:t>
             </a:fld>
             <a:endParaRPr lang="en-US"/>
           </a:p>
@@ -764,7 +764,7 @@
           <a:p>
             <a:fld id="{57DE816E-9A59-9449-9776-FBABF6264B1C}" type="datetimeFigureOut">
               <a:rPr lang="en-US" smtClean="0"/>
-              <a:t>11/17/2014</a:t>
+              <a:t>6/1/17</a:t>
             </a:fld>
             <a:endParaRPr lang="en-US"/>
           </a:p>
@@ -934,7 +934,7 @@
           <a:p>
             <a:fld id="{57DE816E-9A59-9449-9776-FBABF6264B1C}" type="datetimeFigureOut">
               <a:rPr lang="en-US" smtClean="0"/>
-              <a:t>11/17/2014</a:t>
+              <a:t>6/1/17</a:t>
             </a:fld>
             <a:endParaRPr lang="en-US"/>
           </a:p>
@@ -1114,7 +1114,7 @@
           <a:p>
             <a:fld id="{57DE816E-9A59-9449-9776-FBABF6264B1C}" type="datetimeFigureOut">
               <a:rPr lang="en-US" smtClean="0"/>
-              <a:t>11/17/2014</a:t>
+              <a:t>6/1/17</a:t>
             </a:fld>
             <a:endParaRPr lang="en-US"/>
           </a:p>
@@ -1515,7 +1515,7 @@
           <a:p>
             <a:fld id="{57DE816E-9A59-9449-9776-FBABF6264B1C}" type="datetimeFigureOut">
               <a:rPr lang="en-US" smtClean="0"/>
-              <a:t>11/17/2014</a:t>
+              <a:t>6/1/17</a:t>
             </a:fld>
             <a:endParaRPr lang="en-US"/>
           </a:p>
@@ -1761,7 +1761,7 @@
           <a:p>
             <a:fld id="{57DE816E-9A59-9449-9776-FBABF6264B1C}" type="datetimeFigureOut">
               <a:rPr lang="en-US" smtClean="0"/>
-              <a:t>11/17/2014</a:t>
+              <a:t>6/1/17</a:t>
             </a:fld>
             <a:endParaRPr lang="en-US"/>
           </a:p>
@@ -2049,7 +2049,7 @@
           <a:p>
             <a:fld id="{57DE816E-9A59-9449-9776-FBABF6264B1C}" type="datetimeFigureOut">
               <a:rPr lang="en-US" smtClean="0"/>
-              <a:t>11/17/2014</a:t>
+              <a:t>6/1/17</a:t>
             </a:fld>
             <a:endParaRPr lang="en-US"/>
           </a:p>
@@ -2471,7 +2471,7 @@
           <a:p>
             <a:fld id="{57DE816E-9A59-9449-9776-FBABF6264B1C}" type="datetimeFigureOut">
               <a:rPr lang="en-US" smtClean="0"/>
-              <a:t>11/17/2014</a:t>
+              <a:t>6/1/17</a:t>
             </a:fld>
             <a:endParaRPr lang="en-US"/>
           </a:p>
@@ -2589,7 +2589,7 @@
           <a:p>
             <a:fld id="{57DE816E-9A59-9449-9776-FBABF6264B1C}" type="datetimeFigureOut">
               <a:rPr lang="en-US" smtClean="0"/>
-              <a:t>11/17/2014</a:t>
+              <a:t>6/1/17</a:t>
             </a:fld>
             <a:endParaRPr lang="en-US"/>
           </a:p>
@@ -2684,7 +2684,7 @@
           <a:p>
             <a:fld id="{57DE816E-9A59-9449-9776-FBABF6264B1C}" type="datetimeFigureOut">
               <a:rPr lang="en-US" smtClean="0"/>
-              <a:t>11/17/2014</a:t>
+              <a:t>6/1/17</a:t>
             </a:fld>
             <a:endParaRPr lang="en-US"/>
           </a:p>
@@ -2961,7 +2961,7 @@
           <a:p>
             <a:fld id="{57DE816E-9A59-9449-9776-FBABF6264B1C}" type="datetimeFigureOut">
               <a:rPr lang="en-US" smtClean="0"/>
-              <a:t>11/17/2014</a:t>
+              <a:t>6/1/17</a:t>
             </a:fld>
             <a:endParaRPr lang="en-US"/>
           </a:p>
@@ -3218,7 +3218,7 @@
           <a:p>
             <a:fld id="{57DE816E-9A59-9449-9776-FBABF6264B1C}" type="datetimeFigureOut">
               <a:rPr lang="en-US" smtClean="0"/>
-              <a:t>11/17/2014</a:t>
+              <a:t>6/1/17</a:t>
             </a:fld>
             <a:endParaRPr lang="en-US"/>
           </a:p>
@@ -3431,7 +3431,7 @@
           <a:p>
             <a:fld id="{57DE816E-9A59-9449-9776-FBABF6264B1C}" type="datetimeFigureOut">
               <a:rPr lang="en-US" smtClean="0"/>
-              <a:t>11/17/2014</a:t>
+              <a:t>6/1/17</a:t>
             </a:fld>
             <a:endParaRPr lang="en-US"/>
           </a:p>
@@ -4019,7 +4019,7 @@
           <a:graphicData uri="http://schemas.openxmlformats.org/presentationml/2006/ole">
             <mc:AlternateContent xmlns:mc="http://schemas.openxmlformats.org/markup-compatibility/2006">
               <mc:Choice xmlns:v="urn:schemas-microsoft-com:vml" Requires="v">
-                <p:oleObj spid="_x0000_s2170" name="Picture" r:id="rId3" imgW="1828800" imgH="2057400" progId="Word.Picture.8">
+                <p:oleObj spid="_x0000_s2175" name="Picture" r:id="rId3" imgW="1828800" imgH="2057400" progId="Word.Picture.8">
                   <p:embed/>
                 </p:oleObj>
               </mc:Choice>
@@ -4062,14 +4062,14 @@
                       <a:effectLst/>
                       <a:extLst>
                         <a:ext uri="{909E8E84-426E-40dd-AFC4-6F175D3DCCD1}">
-                          <a14:hiddenFill xmlns:a14="http://schemas.microsoft.com/office/drawing/2010/main" xmlns="">
+                          <a14:hiddenFill xmlns="" xmlns:a14="http://schemas.microsoft.com/office/drawing/2010/main">
                             <a:solidFill>
                               <a:srgbClr val="FFFFFF"/>
                             </a:solidFill>
                           </a14:hiddenFill>
                         </a:ext>
                         <a:ext uri="{91240B29-F687-4f45-9708-019B960494DF}">
-                          <a14:hiddenLine xmlns:a14="http://schemas.microsoft.com/office/drawing/2010/main" xmlns="" w="9525">
+                          <a14:hiddenLine xmlns="" xmlns:a14="http://schemas.microsoft.com/office/drawing/2010/main" w="9525">
                             <a:solidFill>
                               <a:srgbClr val="000000"/>
                             </a:solidFill>
@@ -4079,7 +4079,7 @@
                           </a14:hiddenLine>
                         </a:ext>
                         <a:ext uri="{AF507438-7753-43e0-B8FC-AC1667EBCBE1}">
-                          <a14:hiddenEffects xmlns:a14="http://schemas.microsoft.com/office/drawing/2010/main" xmlns="">
+                          <a14:hiddenEffects xmlns="" xmlns:a14="http://schemas.microsoft.com/office/drawing/2010/main">
                             <a:effectLst>
                               <a:outerShdw blurRad="63500" dist="38099" dir="2700000" algn="ctr" rotWithShape="0">
                                 <a:srgbClr val="000000">
@@ -4120,7 +4120,7 @@
           <a:graphicData uri="http://schemas.openxmlformats.org/presentationml/2006/ole">
             <mc:AlternateContent xmlns:mc="http://schemas.openxmlformats.org/markup-compatibility/2006">
               <mc:Choice xmlns:v="urn:schemas-microsoft-com:vml" Requires="v">
-                <p:oleObj spid="_x0000_s2171" name="Picture" r:id="rId5" imgW="1733400" imgH="2152800" progId="Word.Picture.8">
+                <p:oleObj spid="_x0000_s2176" name="Picture" r:id="rId5" imgW="1733400" imgH="2152800" progId="Word.Picture.8">
                   <p:embed/>
                 </p:oleObj>
               </mc:Choice>
@@ -4163,14 +4163,14 @@
                       <a:effectLst/>
                       <a:extLst>
                         <a:ext uri="{909E8E84-426E-40dd-AFC4-6F175D3DCCD1}">
-                          <a14:hiddenFill xmlns:a14="http://schemas.microsoft.com/office/drawing/2010/main" xmlns="">
+                          <a14:hiddenFill xmlns="" xmlns:a14="http://schemas.microsoft.com/office/drawing/2010/main">
                             <a:solidFill>
                               <a:srgbClr val="FFFFFF"/>
                             </a:solidFill>
                           </a14:hiddenFill>
                         </a:ext>
                         <a:ext uri="{91240B29-F687-4f45-9708-019B960494DF}">
-                          <a14:hiddenLine xmlns:a14="http://schemas.microsoft.com/office/drawing/2010/main" xmlns="" w="9525">
+                          <a14:hiddenLine xmlns="" xmlns:a14="http://schemas.microsoft.com/office/drawing/2010/main" w="9525">
                             <a:solidFill>
                               <a:srgbClr val="000000"/>
                             </a:solidFill>
@@ -4180,7 +4180,7 @@
                           </a14:hiddenLine>
                         </a:ext>
                         <a:ext uri="{AF507438-7753-43e0-B8FC-AC1667EBCBE1}">
-                          <a14:hiddenEffects xmlns:a14="http://schemas.microsoft.com/office/drawing/2010/main" xmlns="">
+                          <a14:hiddenEffects xmlns="" xmlns:a14="http://schemas.microsoft.com/office/drawing/2010/main">
                             <a:effectLst>
                               <a:outerShdw blurRad="63500" dist="38099" dir="2700000" algn="ctr" rotWithShape="0">
                                 <a:srgbClr val="000000">
@@ -4221,7 +4221,7 @@
           <a:graphicData uri="http://schemas.openxmlformats.org/presentationml/2006/ole">
             <mc:AlternateContent xmlns:mc="http://schemas.openxmlformats.org/markup-compatibility/2006">
               <mc:Choice xmlns:v="urn:schemas-microsoft-com:vml" Requires="v">
-                <p:oleObj spid="_x0000_s2172" name="Picture" r:id="rId7" imgW="2019240" imgH="2152800" progId="Word.Picture.8">
+                <p:oleObj spid="_x0000_s2177" name="Picture" r:id="rId7" imgW="2019240" imgH="2152800" progId="Word.Picture.8">
                   <p:embed/>
                 </p:oleObj>
               </mc:Choice>
@@ -4264,14 +4264,14 @@
                       <a:effectLst/>
                       <a:extLst>
                         <a:ext uri="{909E8E84-426E-40dd-AFC4-6F175D3DCCD1}">
-                          <a14:hiddenFill xmlns:a14="http://schemas.microsoft.com/office/drawing/2010/main" xmlns="">
+                          <a14:hiddenFill xmlns="" xmlns:a14="http://schemas.microsoft.com/office/drawing/2010/main">
                             <a:solidFill>
                               <a:srgbClr val="FFFFFF"/>
                             </a:solidFill>
                           </a14:hiddenFill>
                         </a:ext>
                         <a:ext uri="{91240B29-F687-4f45-9708-019B960494DF}">
-                          <a14:hiddenLine xmlns:a14="http://schemas.microsoft.com/office/drawing/2010/main" xmlns="" w="9525">
+                          <a14:hiddenLine xmlns="" xmlns:a14="http://schemas.microsoft.com/office/drawing/2010/main" w="9525">
                             <a:solidFill>
                               <a:srgbClr val="000000"/>
                             </a:solidFill>
@@ -4281,7 +4281,7 @@
                           </a14:hiddenLine>
                         </a:ext>
                         <a:ext uri="{AF507438-7753-43e0-B8FC-AC1667EBCBE1}">
-                          <a14:hiddenEffects xmlns:a14="http://schemas.microsoft.com/office/drawing/2010/main" xmlns="">
+                          <a14:hiddenEffects xmlns="" xmlns:a14="http://schemas.microsoft.com/office/drawing/2010/main">
                             <a:effectLst>
                               <a:outerShdw blurRad="63500" dist="38099" dir="2700000" algn="ctr" rotWithShape="0">
                                 <a:srgbClr val="000000">
@@ -4322,7 +4322,7 @@
           <a:graphicData uri="http://schemas.openxmlformats.org/presentationml/2006/ole">
             <mc:AlternateContent xmlns:mc="http://schemas.openxmlformats.org/markup-compatibility/2006">
               <mc:Choice xmlns:v="urn:schemas-microsoft-com:vml" Requires="v">
-                <p:oleObj spid="_x0000_s2173" name="Picture" r:id="rId9" imgW="2019240" imgH="1981080" progId="Word.Picture.8">
+                <p:oleObj spid="_x0000_s2178" name="Picture" r:id="rId9" imgW="2019240" imgH="1981080" progId="Word.Picture.8">
                   <p:embed/>
                 </p:oleObj>
               </mc:Choice>
@@ -4365,14 +4365,14 @@
                       <a:effectLst/>
                       <a:extLst>
                         <a:ext uri="{909E8E84-426E-40dd-AFC4-6F175D3DCCD1}">
-                          <a14:hiddenFill xmlns:a14="http://schemas.microsoft.com/office/drawing/2010/main" xmlns="">
+                          <a14:hiddenFill xmlns="" xmlns:a14="http://schemas.microsoft.com/office/drawing/2010/main">
                             <a:solidFill>
                               <a:srgbClr val="FFFFFF"/>
                             </a:solidFill>
                           </a14:hiddenFill>
                         </a:ext>
                         <a:ext uri="{91240B29-F687-4f45-9708-019B960494DF}">
-                          <a14:hiddenLine xmlns:a14="http://schemas.microsoft.com/office/drawing/2010/main" xmlns="" w="9525">
+                          <a14:hiddenLine xmlns="" xmlns:a14="http://schemas.microsoft.com/office/drawing/2010/main" w="9525">
                             <a:solidFill>
                               <a:srgbClr val="000000"/>
                             </a:solidFill>
@@ -4382,7 +4382,7 @@
                           </a14:hiddenLine>
                         </a:ext>
                         <a:ext uri="{AF507438-7753-43e0-B8FC-AC1667EBCBE1}">
-                          <a14:hiddenEffects xmlns:a14="http://schemas.microsoft.com/office/drawing/2010/main" xmlns="">
+                          <a14:hiddenEffects xmlns="" xmlns:a14="http://schemas.microsoft.com/office/drawing/2010/main">
                             <a:effectLst>
                               <a:outerShdw blurRad="63500" dist="38099" dir="2700000" algn="ctr" rotWithShape="0">
                                 <a:srgbClr val="000000">
@@ -4758,44 +4758,6 @@
       </p:grpSpPr>
       <p:sp>
         <p:nvSpPr>
-          <p:cNvPr id="2" name="Rectangle 1"/>
-          <p:cNvSpPr/>
-          <p:nvPr/>
-        </p:nvSpPr>
-        <p:spPr>
-          <a:xfrm>
-            <a:off x="1070308" y="2124073"/>
-            <a:ext cx="7092575" cy="4239865"/>
-          </a:xfrm>
-          <a:prstGeom prst="rect">
-            <a:avLst/>
-          </a:prstGeom>
-        </p:spPr>
-        <p:style>
-          <a:lnRef idx="1">
-            <a:schemeClr val="accent1"/>
-          </a:lnRef>
-          <a:fillRef idx="3">
-            <a:schemeClr val="accent1"/>
-          </a:fillRef>
-          <a:effectRef idx="2">
-            <a:schemeClr val="accent1"/>
-          </a:effectRef>
-          <a:fontRef idx="minor">
-            <a:schemeClr val="lt1"/>
-          </a:fontRef>
-        </p:style>
-        <p:txBody>
-          <a:bodyPr rtlCol="0" anchor="ctr"/>
-          <a:lstStyle/>
-          <a:p>
-            <a:pPr algn="ctr"/>
-            <a:endParaRPr lang="en-US"/>
-          </a:p>
-        </p:txBody>
-      </p:sp>
-      <p:sp>
-        <p:nvSpPr>
           <p:cNvPr id="28674" name="Rectangle 2"/>
           <p:cNvSpPr>
             <a:spLocks noGrp="1" noChangeArrowheads="1"/>
@@ -4862,7 +4824,7 @@
           <p:nvPr>
             <p:extLst>
               <p:ext uri="{D42A27DB-BD31-4B8C-83A1-F6EECF244321}">
-                <p14:modId xmlns:p14="http://schemas.microsoft.com/office/powerpoint/2010/main" val="3567231088"/>
+                <p14:modId xmlns:p14="http://schemas.microsoft.com/office/powerpoint/2010/main" val="1241952828"/>
               </p:ext>
             </p:extLst>
           </p:nvPr>
@@ -4875,7 +4837,7 @@
           <a:graphicData uri="http://schemas.openxmlformats.org/presentationml/2006/ole">
             <mc:AlternateContent xmlns:mc="http://schemas.openxmlformats.org/markup-compatibility/2006">
               <mc:Choice xmlns:v="urn:schemas-microsoft-com:vml" Requires="v">
-                <p:oleObj spid="_x0000_s3101" name="Picture" r:id="rId3" imgW="3753000" imgH="2390760" progId="Word.Picture.8">
+                <p:oleObj spid="_x0000_s3103" name="Picture" r:id="rId3" imgW="3753000" imgH="2390760" progId="Word.Picture.8">
                   <p:embed/>
                 </p:oleObj>
               </mc:Choice>
@@ -4918,14 +4880,14 @@
                       <a:effectLst/>
                       <a:extLst>
                         <a:ext uri="{909E8E84-426E-40dd-AFC4-6F175D3DCCD1}">
-                          <a14:hiddenFill xmlns:a14="http://schemas.microsoft.com/office/drawing/2010/main" xmlns="">
+                          <a14:hiddenFill xmlns="" xmlns:a14="http://schemas.microsoft.com/office/drawing/2010/main">
                             <a:solidFill>
                               <a:srgbClr val="FFFFFF"/>
                             </a:solidFill>
                           </a14:hiddenFill>
                         </a:ext>
                         <a:ext uri="{91240B29-F687-4f45-9708-019B960494DF}">
-                          <a14:hiddenLine xmlns:a14="http://schemas.microsoft.com/office/drawing/2010/main" xmlns="" w="9525">
+                          <a14:hiddenLine xmlns="" xmlns:a14="http://schemas.microsoft.com/office/drawing/2010/main" w="9525">
                             <a:solidFill>
                               <a:srgbClr val="000000"/>
                             </a:solidFill>
@@ -4935,7 +4897,7 @@
                           </a14:hiddenLine>
                         </a:ext>
                         <a:ext uri="{AF507438-7753-43e0-B8FC-AC1667EBCBE1}">
-                          <a14:hiddenEffects xmlns:a14="http://schemas.microsoft.com/office/drawing/2010/main" xmlns="">
+                          <a14:hiddenEffects xmlns="" xmlns:a14="http://schemas.microsoft.com/office/drawing/2010/main">
                             <a:effectLst>
                               <a:outerShdw blurRad="63500" dist="38099" dir="2700000" algn="ctr" rotWithShape="0">
                                 <a:srgbClr val="000000">
@@ -4954,6 +4916,30 @@
           </a:graphicData>
         </a:graphic>
       </p:graphicFrame>
+      <p:pic>
+        <p:nvPicPr>
+          <p:cNvPr id="4" name="Picture 3"/>
+          <p:cNvPicPr>
+            <a:picLocks noChangeAspect="1"/>
+          </p:cNvPicPr>
+          <p:nvPr/>
+        </p:nvPicPr>
+        <p:blipFill>
+          <a:blip r:embed="rId5"/>
+          <a:stretch>
+            <a:fillRect/>
+          </a:stretch>
+        </p:blipFill>
+        <p:spPr>
+          <a:xfrm>
+            <a:off x="1365683" y="2232230"/>
+            <a:ext cx="6501823" cy="4023550"/>
+          </a:xfrm>
+          <a:prstGeom prst="rect">
+            <a:avLst/>
+          </a:prstGeom>
+        </p:spPr>
+      </p:pic>
     </p:spTree>
     <p:extLst>
       <p:ext uri="{BB962C8B-B14F-4D97-AF65-F5344CB8AC3E}">
@@ -5948,7 +5934,7 @@
           </a:ln>
           <a:extLst>
             <a:ext uri="{909E8E84-426E-40dd-AFC4-6F175D3DCCD1}">
-              <a14:hiddenFill xmlns:a14="http://schemas.microsoft.com/office/drawing/2010/main" xmlns="">
+              <a14:hiddenFill xmlns="" xmlns:a14="http://schemas.microsoft.com/office/drawing/2010/main">
                 <a:solidFill>
                   <a:srgbClr val="FFFFFF"/>
                 </a:solidFill>
@@ -5991,7 +5977,7 @@
           </a:ln>
           <a:extLst>
             <a:ext uri="{909E8E84-426E-40dd-AFC4-6F175D3DCCD1}">
-              <a14:hiddenFill xmlns:a14="http://schemas.microsoft.com/office/drawing/2010/main" xmlns="">
+              <a14:hiddenFill xmlns="" xmlns:a14="http://schemas.microsoft.com/office/drawing/2010/main">
                 <a:solidFill>
                   <a:srgbClr val="FFFFFF"/>
                 </a:solidFill>
@@ -6034,7 +6020,7 @@
           </a:ln>
           <a:extLst>
             <a:ext uri="{909E8E84-426E-40dd-AFC4-6F175D3DCCD1}">
-              <a14:hiddenFill xmlns:a14="http://schemas.microsoft.com/office/drawing/2010/main" xmlns="">
+              <a14:hiddenFill xmlns="" xmlns:a14="http://schemas.microsoft.com/office/drawing/2010/main">
                 <a:solidFill>
                   <a:srgbClr val="FFFFFF"/>
                 </a:solidFill>
@@ -6072,14 +6058,14 @@
           </a:ln>
           <a:extLst>
             <a:ext uri="{909E8E84-426E-40dd-AFC4-6F175D3DCCD1}">
-              <a14:hiddenFill xmlns:a14="http://schemas.microsoft.com/office/drawing/2010/main" xmlns="">
+              <a14:hiddenFill xmlns="" xmlns:a14="http://schemas.microsoft.com/office/drawing/2010/main">
                 <a:solidFill>
                   <a:srgbClr val="FFFFFF"/>
                 </a:solidFill>
               </a14:hiddenFill>
             </a:ext>
             <a:ext uri="{91240B29-F687-4f45-9708-019B960494DF}">
-              <a14:hiddenLine xmlns:a14="http://schemas.microsoft.com/office/drawing/2010/main" xmlns="" w="0">
+              <a14:hiddenLine xmlns="" xmlns:a14="http://schemas.microsoft.com/office/drawing/2010/main" w="0">
                 <a:solidFill>
                   <a:schemeClr val="tx2"/>
                 </a:solidFill>
@@ -6151,14 +6137,14 @@
           </a:ln>
           <a:extLst>
             <a:ext uri="{909E8E84-426E-40dd-AFC4-6F175D3DCCD1}">
-              <a14:hiddenFill xmlns:a14="http://schemas.microsoft.com/office/drawing/2010/main" xmlns="">
+              <a14:hiddenFill xmlns="" xmlns:a14="http://schemas.microsoft.com/office/drawing/2010/main">
                 <a:solidFill>
                   <a:srgbClr val="FFFFFF"/>
                 </a:solidFill>
               </a14:hiddenFill>
             </a:ext>
             <a:ext uri="{91240B29-F687-4f45-9708-019B960494DF}">
-              <a14:hiddenLine xmlns:a14="http://schemas.microsoft.com/office/drawing/2010/main" xmlns="" w="9525">
+              <a14:hiddenLine xmlns="" xmlns:a14="http://schemas.microsoft.com/office/drawing/2010/main" w="9525">
                 <a:solidFill>
                   <a:schemeClr val="tx2"/>
                 </a:solidFill>
@@ -6213,14 +6199,14 @@
           </a:ln>
           <a:extLst>
             <a:ext uri="{909E8E84-426E-40dd-AFC4-6F175D3DCCD1}">
-              <a14:hiddenFill xmlns:a14="http://schemas.microsoft.com/office/drawing/2010/main" xmlns="">
+              <a14:hiddenFill xmlns="" xmlns:a14="http://schemas.microsoft.com/office/drawing/2010/main">
                 <a:solidFill>
                   <a:srgbClr val="FFFFFF"/>
                 </a:solidFill>
               </a14:hiddenFill>
             </a:ext>
             <a:ext uri="{91240B29-F687-4f45-9708-019B960494DF}">
-              <a14:hiddenLine xmlns:a14="http://schemas.microsoft.com/office/drawing/2010/main" xmlns="" w="9525">
+              <a14:hiddenLine xmlns="" xmlns:a14="http://schemas.microsoft.com/office/drawing/2010/main" w="9525">
                 <a:solidFill>
                   <a:schemeClr val="tx2"/>
                 </a:solidFill>
@@ -6274,14 +6260,14 @@
           </a:ln>
           <a:extLst>
             <a:ext uri="{909E8E84-426E-40dd-AFC4-6F175D3DCCD1}">
-              <a14:hiddenFill xmlns:a14="http://schemas.microsoft.com/office/drawing/2010/main" xmlns="">
+              <a14:hiddenFill xmlns="" xmlns:a14="http://schemas.microsoft.com/office/drawing/2010/main">
                 <a:solidFill>
                   <a:srgbClr val="FFFFFF"/>
                 </a:solidFill>
               </a14:hiddenFill>
             </a:ext>
             <a:ext uri="{91240B29-F687-4f45-9708-019B960494DF}">
-              <a14:hiddenLine xmlns:a14="http://schemas.microsoft.com/office/drawing/2010/main" xmlns="" w="3175">
+              <a14:hiddenLine xmlns="" xmlns:a14="http://schemas.microsoft.com/office/drawing/2010/main" w="3175">
                 <a:solidFill>
                   <a:schemeClr val="tx2"/>
                 </a:solidFill>
@@ -6336,14 +6322,14 @@
           </a:ln>
           <a:extLst>
             <a:ext uri="{909E8E84-426E-40dd-AFC4-6F175D3DCCD1}">
-              <a14:hiddenFill xmlns:a14="http://schemas.microsoft.com/office/drawing/2010/main" xmlns="">
+              <a14:hiddenFill xmlns="" xmlns:a14="http://schemas.microsoft.com/office/drawing/2010/main">
                 <a:solidFill>
                   <a:srgbClr val="FFFFFF"/>
                 </a:solidFill>
               </a14:hiddenFill>
             </a:ext>
             <a:ext uri="{91240B29-F687-4f45-9708-019B960494DF}">
-              <a14:hiddenLine xmlns:a14="http://schemas.microsoft.com/office/drawing/2010/main" xmlns="" w="3175">
+              <a14:hiddenLine xmlns="" xmlns:a14="http://schemas.microsoft.com/office/drawing/2010/main" w="3175">
                 <a:solidFill>
                   <a:schemeClr val="tx2"/>
                 </a:solidFill>
@@ -6408,14 +6394,14 @@
           </a:ln>
           <a:extLst>
             <a:ext uri="{909E8E84-426E-40dd-AFC4-6F175D3DCCD1}">
-              <a14:hiddenFill xmlns:a14="http://schemas.microsoft.com/office/drawing/2010/main" xmlns="">
+              <a14:hiddenFill xmlns="" xmlns:a14="http://schemas.microsoft.com/office/drawing/2010/main">
                 <a:solidFill>
                   <a:srgbClr val="FFFFFF"/>
                 </a:solidFill>
               </a14:hiddenFill>
             </a:ext>
             <a:ext uri="{91240B29-F687-4f45-9708-019B960494DF}">
-              <a14:hiddenLine xmlns:a14="http://schemas.microsoft.com/office/drawing/2010/main" xmlns="" w="3175">
+              <a14:hiddenLine xmlns="" xmlns:a14="http://schemas.microsoft.com/office/drawing/2010/main" w="3175">
                 <a:solidFill>
                   <a:schemeClr val="tx2"/>
                 </a:solidFill>
@@ -6481,14 +6467,14 @@
           </a:ln>
           <a:extLst>
             <a:ext uri="{909E8E84-426E-40dd-AFC4-6F175D3DCCD1}">
-              <a14:hiddenFill xmlns:a14="http://schemas.microsoft.com/office/drawing/2010/main" xmlns="">
+              <a14:hiddenFill xmlns="" xmlns:a14="http://schemas.microsoft.com/office/drawing/2010/main">
                 <a:solidFill>
                   <a:srgbClr val="FFFFFF"/>
                 </a:solidFill>
               </a14:hiddenFill>
             </a:ext>
             <a:ext uri="{91240B29-F687-4f45-9708-019B960494DF}">
-              <a14:hiddenLine xmlns:a14="http://schemas.microsoft.com/office/drawing/2010/main" xmlns="" w="3175">
+              <a14:hiddenLine xmlns="" xmlns:a14="http://schemas.microsoft.com/office/drawing/2010/main" w="3175">
                 <a:solidFill>
                   <a:schemeClr val="tx2"/>
                 </a:solidFill>
@@ -6554,14 +6540,14 @@
           </a:ln>
           <a:extLst>
             <a:ext uri="{909E8E84-426E-40dd-AFC4-6F175D3DCCD1}">
-              <a14:hiddenFill xmlns:a14="http://schemas.microsoft.com/office/drawing/2010/main" xmlns="">
+              <a14:hiddenFill xmlns="" xmlns:a14="http://schemas.microsoft.com/office/drawing/2010/main">
                 <a:solidFill>
                   <a:srgbClr val="FFFFFF"/>
                 </a:solidFill>
               </a14:hiddenFill>
             </a:ext>
             <a:ext uri="{91240B29-F687-4f45-9708-019B960494DF}">
-              <a14:hiddenLine xmlns:a14="http://schemas.microsoft.com/office/drawing/2010/main" xmlns="" w="9525">
+              <a14:hiddenLine xmlns="" xmlns:a14="http://schemas.microsoft.com/office/drawing/2010/main" w="9525">
                 <a:solidFill>
                   <a:schemeClr val="tx2"/>
                 </a:solidFill>
@@ -6609,14 +6595,14 @@
           </a:ln>
           <a:extLst>
             <a:ext uri="{909E8E84-426E-40dd-AFC4-6F175D3DCCD1}">
-              <a14:hiddenFill xmlns:a14="http://schemas.microsoft.com/office/drawing/2010/main" xmlns="">
+              <a14:hiddenFill xmlns="" xmlns:a14="http://schemas.microsoft.com/office/drawing/2010/main">
                 <a:solidFill>
                   <a:srgbClr val="FFFFFF"/>
                 </a:solidFill>
               </a14:hiddenFill>
             </a:ext>
             <a:ext uri="{91240B29-F687-4f45-9708-019B960494DF}">
-              <a14:hiddenLine xmlns:a14="http://schemas.microsoft.com/office/drawing/2010/main" xmlns="" w="9525">
+              <a14:hiddenLine xmlns="" xmlns:a14="http://schemas.microsoft.com/office/drawing/2010/main" w="9525">
                 <a:solidFill>
                   <a:schemeClr val="tx2"/>
                 </a:solidFill>
@@ -6664,14 +6650,14 @@
           </a:ln>
           <a:extLst>
             <a:ext uri="{909E8E84-426E-40dd-AFC4-6F175D3DCCD1}">
-              <a14:hiddenFill xmlns:a14="http://schemas.microsoft.com/office/drawing/2010/main" xmlns="">
+              <a14:hiddenFill xmlns="" xmlns:a14="http://schemas.microsoft.com/office/drawing/2010/main">
                 <a:solidFill>
                   <a:srgbClr val="FFFFFF"/>
                 </a:solidFill>
               </a14:hiddenFill>
             </a:ext>
             <a:ext uri="{91240B29-F687-4f45-9708-019B960494DF}">
-              <a14:hiddenLine xmlns:a14="http://schemas.microsoft.com/office/drawing/2010/main" xmlns="" w="9525">
+              <a14:hiddenLine xmlns="" xmlns:a14="http://schemas.microsoft.com/office/drawing/2010/main" w="9525">
                 <a:solidFill>
                   <a:schemeClr val="tx2"/>
                 </a:solidFill>
@@ -6720,14 +6706,14 @@
           <a:effectLst/>
           <a:extLst>
             <a:ext uri="{909E8E84-426E-40dd-AFC4-6F175D3DCCD1}">
-              <a14:hiddenFill xmlns:a14="http://schemas.microsoft.com/office/drawing/2010/main" xmlns="">
+              <a14:hiddenFill xmlns="" xmlns:a14="http://schemas.microsoft.com/office/drawing/2010/main">
                 <a:solidFill>
                   <a:schemeClr val="accent1"/>
                 </a:solidFill>
               </a14:hiddenFill>
             </a:ext>
             <a:ext uri="{91240B29-F687-4f45-9708-019B960494DF}">
-              <a14:hiddenLine xmlns:a14="http://schemas.microsoft.com/office/drawing/2010/main" xmlns="" w="9525">
+              <a14:hiddenLine xmlns="" xmlns:a14="http://schemas.microsoft.com/office/drawing/2010/main" w="9525">
                 <a:solidFill>
                   <a:schemeClr val="tx1"/>
                 </a:solidFill>
@@ -6737,7 +6723,7 @@
               </a14:hiddenLine>
             </a:ext>
             <a:ext uri="{AF507438-7753-43e0-B8FC-AC1667EBCBE1}">
-              <a14:hiddenEffects xmlns:a14="http://schemas.microsoft.com/office/drawing/2010/main" xmlns="">
+              <a14:hiddenEffects xmlns="" xmlns:a14="http://schemas.microsoft.com/office/drawing/2010/main">
                 <a:effectLst>
                   <a:outerShdw blurRad="63500" dist="38099" dir="2700000" algn="ctr" rotWithShape="0">
                     <a:schemeClr val="bg2">
@@ -7015,14 +7001,14 @@
           <a:effectLst/>
           <a:extLst>
             <a:ext uri="{909E8E84-426E-40dd-AFC4-6F175D3DCCD1}">
-              <a14:hiddenFill xmlns:a14="http://schemas.microsoft.com/office/drawing/2010/main" xmlns="">
+              <a14:hiddenFill xmlns="" xmlns:a14="http://schemas.microsoft.com/office/drawing/2010/main">
                 <a:solidFill>
                   <a:schemeClr val="accent1"/>
                 </a:solidFill>
               </a14:hiddenFill>
             </a:ext>
             <a:ext uri="{91240B29-F687-4f45-9708-019B960494DF}">
-              <a14:hiddenLine xmlns:a14="http://schemas.microsoft.com/office/drawing/2010/main" xmlns="" w="9525">
+              <a14:hiddenLine xmlns="" xmlns:a14="http://schemas.microsoft.com/office/drawing/2010/main" w="9525">
                 <a:solidFill>
                   <a:schemeClr val="tx1"/>
                 </a:solidFill>
@@ -7032,7 +7018,7 @@
               </a14:hiddenLine>
             </a:ext>
             <a:ext uri="{AF507438-7753-43e0-B8FC-AC1667EBCBE1}">
-              <a14:hiddenEffects xmlns:a14="http://schemas.microsoft.com/office/drawing/2010/main" xmlns="">
+              <a14:hiddenEffects xmlns="" xmlns:a14="http://schemas.microsoft.com/office/drawing/2010/main">
                 <a:effectLst>
                   <a:outerShdw blurRad="63500" dist="38099" dir="2700000" algn="ctr" rotWithShape="0">
                     <a:schemeClr val="bg2">
@@ -7339,7 +7325,7 @@
           <a:graphicData uri="http://schemas.openxmlformats.org/presentationml/2006/ole">
             <mc:AlternateContent xmlns:mc="http://schemas.openxmlformats.org/markup-compatibility/2006">
               <mc:Choice xmlns:v="urn:schemas-microsoft-com:vml" Requires="v">
-                <p:oleObj spid="_x0000_s8217" name="Document" r:id="rId4" imgW="5630040" imgH="3932280" progId="Word.Document.8">
+                <p:oleObj spid="_x0000_s8219" name="Document" r:id="rId4" imgW="5630040" imgH="3932280" progId="Word.Document.8">
                   <p:embed/>
                 </p:oleObj>
               </mc:Choice>
@@ -7382,14 +7368,14 @@
                       <a:effectLst/>
                       <a:extLst>
                         <a:ext uri="{909E8E84-426E-40dd-AFC4-6F175D3DCCD1}">
-                          <a14:hiddenFill xmlns:a14="http://schemas.microsoft.com/office/drawing/2010/main" xmlns="">
+                          <a14:hiddenFill xmlns="" xmlns:a14="http://schemas.microsoft.com/office/drawing/2010/main">
                             <a:solidFill>
                               <a:schemeClr val="accent1"/>
                             </a:solidFill>
                           </a14:hiddenFill>
                         </a:ext>
                         <a:ext uri="{91240B29-F687-4f45-9708-019B960494DF}">
-                          <a14:hiddenLine xmlns:a14="http://schemas.microsoft.com/office/drawing/2010/main" xmlns="" w="9525">
+                          <a14:hiddenLine xmlns="" xmlns:a14="http://schemas.microsoft.com/office/drawing/2010/main" w="9525">
                             <a:solidFill>
                               <a:schemeClr val="tx1"/>
                             </a:solidFill>
@@ -7399,7 +7385,7 @@
                           </a14:hiddenLine>
                         </a:ext>
                         <a:ext uri="{AF507438-7753-43e0-B8FC-AC1667EBCBE1}">
-                          <a14:hiddenEffects xmlns:a14="http://schemas.microsoft.com/office/drawing/2010/main" xmlns="">
+                          <a14:hiddenEffects xmlns="" xmlns:a14="http://schemas.microsoft.com/office/drawing/2010/main">
                             <a:effectLst>
                               <a:outerShdw blurRad="63500" dist="38099" dir="2700000" algn="ctr" rotWithShape="0">
                                 <a:schemeClr val="bg2">
@@ -8665,7 +8651,7 @@
           <a:effectLst/>
           <a:extLst>
             <a:ext uri="{AF507438-7753-43e0-B8FC-AC1667EBCBE1}">
-              <a14:hiddenEffects xmlns:a14="http://schemas.microsoft.com/office/drawing/2010/main" xmlns="">
+              <a14:hiddenEffects xmlns="" xmlns:a14="http://schemas.microsoft.com/office/drawing/2010/main">
                 <a:effectLst>
                   <a:outerShdw blurRad="63500" dist="38099" dir="2700000" algn="ctr" rotWithShape="0">
                     <a:srgbClr val="000000">
@@ -8726,7 +8712,7 @@
           <a:effectLst/>
           <a:extLst>
             <a:ext uri="{AF507438-7753-43e0-B8FC-AC1667EBCBE1}">
-              <a14:hiddenEffects xmlns:a14="http://schemas.microsoft.com/office/drawing/2010/main" xmlns="">
+              <a14:hiddenEffects xmlns="" xmlns:a14="http://schemas.microsoft.com/office/drawing/2010/main">
                 <a:effectLst>
                   <a:outerShdw blurRad="63500" dist="38099" dir="2700000" algn="ctr" rotWithShape="0">
                     <a:srgbClr val="000000">
@@ -8787,7 +8773,7 @@
           <a:effectLst/>
           <a:extLst>
             <a:ext uri="{AF507438-7753-43e0-B8FC-AC1667EBCBE1}">
-              <a14:hiddenEffects xmlns:a14="http://schemas.microsoft.com/office/drawing/2010/main" xmlns="">
+              <a14:hiddenEffects xmlns="" xmlns:a14="http://schemas.microsoft.com/office/drawing/2010/main">
                 <a:effectLst>
                   <a:outerShdw blurRad="63500" dist="38099" dir="2700000" algn="ctr" rotWithShape="0">
                     <a:srgbClr val="000000">
@@ -8931,7 +8917,7 @@
           <a:effectLst/>
           <a:extLst>
             <a:ext uri="{AF507438-7753-43e0-B8FC-AC1667EBCBE1}">
-              <a14:hiddenEffects xmlns:a14="http://schemas.microsoft.com/office/drawing/2010/main" xmlns="">
+              <a14:hiddenEffects xmlns="" xmlns:a14="http://schemas.microsoft.com/office/drawing/2010/main">
                 <a:effectLst>
                   <a:outerShdw blurRad="63500" dist="38099" dir="2700000" algn="ctr" rotWithShape="0">
                     <a:srgbClr val="000000">
@@ -9066,7 +9052,7 @@
           <a:effectLst/>
           <a:extLst>
             <a:ext uri="{AF507438-7753-43e0-B8FC-AC1667EBCBE1}">
-              <a14:hiddenEffects xmlns:a14="http://schemas.microsoft.com/office/drawing/2010/main" xmlns="">
+              <a14:hiddenEffects xmlns="" xmlns:a14="http://schemas.microsoft.com/office/drawing/2010/main">
                 <a:effectLst>
                   <a:outerShdw blurRad="63500" dist="38099" dir="2700000" algn="ctr" rotWithShape="0">
                     <a:srgbClr val="000000">
@@ -9119,7 +9105,7 @@
           <a:effectLst/>
           <a:extLst>
             <a:ext uri="{AF507438-7753-43e0-B8FC-AC1667EBCBE1}">
-              <a14:hiddenEffects xmlns:a14="http://schemas.microsoft.com/office/drawing/2010/main" xmlns="">
+              <a14:hiddenEffects xmlns="" xmlns:a14="http://schemas.microsoft.com/office/drawing/2010/main">
                 <a:effectLst>
                   <a:outerShdw blurRad="63500" dist="38099" dir="2700000" algn="ctr" rotWithShape="0">
                     <a:srgbClr val="000000">
@@ -9172,7 +9158,7 @@
           <a:effectLst/>
           <a:extLst>
             <a:ext uri="{AF507438-7753-43e0-B8FC-AC1667EBCBE1}">
-              <a14:hiddenEffects xmlns:a14="http://schemas.microsoft.com/office/drawing/2010/main" xmlns="">
+              <a14:hiddenEffects xmlns="" xmlns:a14="http://schemas.microsoft.com/office/drawing/2010/main">
                 <a:effectLst>
                   <a:outerShdw blurRad="63500" dist="38099" dir="2700000" algn="ctr" rotWithShape="0">
                     <a:srgbClr val="000000">
@@ -9215,14 +9201,14 @@
           <a:effectLst/>
           <a:extLst>
             <a:ext uri="{909E8E84-426E-40dd-AFC4-6F175D3DCCD1}">
-              <a14:hiddenFill xmlns:a14="http://schemas.microsoft.com/office/drawing/2010/main" xmlns="">
+              <a14:hiddenFill xmlns="" xmlns:a14="http://schemas.microsoft.com/office/drawing/2010/main">
                 <a:solidFill>
                   <a:srgbClr val="FFFFFF"/>
                 </a:solidFill>
               </a14:hiddenFill>
             </a:ext>
             <a:ext uri="{91240B29-F687-4f45-9708-019B960494DF}">
-              <a14:hiddenLine xmlns:a14="http://schemas.microsoft.com/office/drawing/2010/main" xmlns="" w="9525">
+              <a14:hiddenLine xmlns="" xmlns:a14="http://schemas.microsoft.com/office/drawing/2010/main" w="9525">
                 <a:solidFill>
                   <a:schemeClr val="tx1"/>
                 </a:solidFill>
@@ -9232,7 +9218,7 @@
               </a14:hiddenLine>
             </a:ext>
             <a:ext uri="{AF507438-7753-43e0-B8FC-AC1667EBCBE1}">
-              <a14:hiddenEffects xmlns:a14="http://schemas.microsoft.com/office/drawing/2010/main" xmlns="">
+              <a14:hiddenEffects xmlns="" xmlns:a14="http://schemas.microsoft.com/office/drawing/2010/main">
                 <a:effectLst>
                   <a:outerShdw blurRad="63500" dist="38099" dir="2700000" algn="ctr" rotWithShape="0">
                     <a:srgbClr val="000000">
@@ -9283,14 +9269,14 @@
           <a:effectLst/>
           <a:extLst>
             <a:ext uri="{909E8E84-426E-40dd-AFC4-6F175D3DCCD1}">
-              <a14:hiddenFill xmlns:a14="http://schemas.microsoft.com/office/drawing/2010/main" xmlns="">
+              <a14:hiddenFill xmlns="" xmlns:a14="http://schemas.microsoft.com/office/drawing/2010/main">
                 <a:solidFill>
                   <a:srgbClr val="FFFFFF"/>
                 </a:solidFill>
               </a14:hiddenFill>
             </a:ext>
             <a:ext uri="{91240B29-F687-4f45-9708-019B960494DF}">
-              <a14:hiddenLine xmlns:a14="http://schemas.microsoft.com/office/drawing/2010/main" xmlns="" w="9525">
+              <a14:hiddenLine xmlns="" xmlns:a14="http://schemas.microsoft.com/office/drawing/2010/main" w="9525">
                 <a:solidFill>
                   <a:schemeClr val="tx1"/>
                 </a:solidFill>
@@ -9300,7 +9286,7 @@
               </a14:hiddenLine>
             </a:ext>
             <a:ext uri="{AF507438-7753-43e0-B8FC-AC1667EBCBE1}">
-              <a14:hiddenEffects xmlns:a14="http://schemas.microsoft.com/office/drawing/2010/main" xmlns="">
+              <a14:hiddenEffects xmlns="" xmlns:a14="http://schemas.microsoft.com/office/drawing/2010/main">
                 <a:effectLst>
                   <a:outerShdw blurRad="63500" dist="38099" dir="2700000" algn="ctr" rotWithShape="0">
                     <a:srgbClr val="000000">
@@ -9391,14 +9377,14 @@
           <a:effectLst/>
           <a:extLst>
             <a:ext uri="{909E8E84-426E-40dd-AFC4-6F175D3DCCD1}">
-              <a14:hiddenFill xmlns:a14="http://schemas.microsoft.com/office/drawing/2010/main" xmlns="">
+              <a14:hiddenFill xmlns="" xmlns:a14="http://schemas.microsoft.com/office/drawing/2010/main">
                 <a:solidFill>
                   <a:schemeClr val="accent1"/>
                 </a:solidFill>
               </a14:hiddenFill>
             </a:ext>
             <a:ext uri="{91240B29-F687-4f45-9708-019B960494DF}">
-              <a14:hiddenLine xmlns:a14="http://schemas.microsoft.com/office/drawing/2010/main" xmlns="" w="9525">
+              <a14:hiddenLine xmlns="" xmlns:a14="http://schemas.microsoft.com/office/drawing/2010/main" w="9525">
                 <a:solidFill>
                   <a:schemeClr val="tx1"/>
                 </a:solidFill>
@@ -9408,7 +9394,7 @@
               </a14:hiddenLine>
             </a:ext>
             <a:ext uri="{AF507438-7753-43e0-B8FC-AC1667EBCBE1}">
-              <a14:hiddenEffects xmlns:a14="http://schemas.microsoft.com/office/drawing/2010/main" xmlns="">
+              <a14:hiddenEffects xmlns="" xmlns:a14="http://schemas.microsoft.com/office/drawing/2010/main">
                 <a:effectLst>
                   <a:outerShdw blurRad="63500" dist="38099" dir="2700000" algn="ctr" rotWithShape="0">
                     <a:schemeClr val="bg2">
@@ -9804,14 +9790,14 @@
           <a:effectLst/>
           <a:extLst>
             <a:ext uri="{909E8E84-426E-40dd-AFC4-6F175D3DCCD1}">
-              <a14:hiddenFill xmlns:a14="http://schemas.microsoft.com/office/drawing/2010/main" xmlns="">
+              <a14:hiddenFill xmlns="" xmlns:a14="http://schemas.microsoft.com/office/drawing/2010/main">
                 <a:solidFill>
                   <a:schemeClr val="accent1"/>
                 </a:solidFill>
               </a14:hiddenFill>
             </a:ext>
             <a:ext uri="{91240B29-F687-4f45-9708-019B960494DF}">
-              <a14:hiddenLine xmlns:a14="http://schemas.microsoft.com/office/drawing/2010/main" xmlns="" w="9525">
+              <a14:hiddenLine xmlns="" xmlns:a14="http://schemas.microsoft.com/office/drawing/2010/main" w="9525">
                 <a:solidFill>
                   <a:schemeClr val="tx1"/>
                 </a:solidFill>
@@ -9821,7 +9807,7 @@
               </a14:hiddenLine>
             </a:ext>
             <a:ext uri="{AF507438-7753-43e0-B8FC-AC1667EBCBE1}">
-              <a14:hiddenEffects xmlns:a14="http://schemas.microsoft.com/office/drawing/2010/main" xmlns="">
+              <a14:hiddenEffects xmlns="" xmlns:a14="http://schemas.microsoft.com/office/drawing/2010/main">
                 <a:effectLst>
                   <a:outerShdw blurRad="63500" dist="38099" dir="2700000" algn="ctr" rotWithShape="0">
                     <a:schemeClr val="bg2">
@@ -9886,12 +9872,12 @@
           <a:effectLst/>
           <a:extLst>
             <a:ext uri="{909E8E84-426E-40dd-AFC4-6F175D3DCCD1}">
-              <a14:hiddenFill xmlns:a14="http://schemas.microsoft.com/office/drawing/2010/main" xmlns="">
+              <a14:hiddenFill xmlns="" xmlns:a14="http://schemas.microsoft.com/office/drawing/2010/main">
                 <a:noFill/>
               </a14:hiddenFill>
             </a:ext>
             <a:ext uri="{AF507438-7753-43e0-B8FC-AC1667EBCBE1}">
-              <a14:hiddenEffects xmlns:a14="http://schemas.microsoft.com/office/drawing/2010/main" xmlns="">
+              <a14:hiddenEffects xmlns="" xmlns:a14="http://schemas.microsoft.com/office/drawing/2010/main">
                 <a:effectLst>
                   <a:outerShdw blurRad="63500" dist="38099" dir="2700000" algn="ctr" rotWithShape="0">
                     <a:schemeClr val="bg2">
@@ -9939,12 +9925,12 @@
           <a:effectLst/>
           <a:extLst>
             <a:ext uri="{909E8E84-426E-40dd-AFC4-6F175D3DCCD1}">
-              <a14:hiddenFill xmlns:a14="http://schemas.microsoft.com/office/drawing/2010/main" xmlns="">
+              <a14:hiddenFill xmlns="" xmlns:a14="http://schemas.microsoft.com/office/drawing/2010/main">
                 <a:noFill/>
               </a14:hiddenFill>
             </a:ext>
             <a:ext uri="{AF507438-7753-43e0-B8FC-AC1667EBCBE1}">
-              <a14:hiddenEffects xmlns:a14="http://schemas.microsoft.com/office/drawing/2010/main" xmlns="">
+              <a14:hiddenEffects xmlns="" xmlns:a14="http://schemas.microsoft.com/office/drawing/2010/main">
                 <a:effectLst>
                   <a:outerShdw blurRad="63500" dist="38099" dir="2700000" algn="ctr" rotWithShape="0">
                     <a:schemeClr val="bg2">
@@ -9987,14 +9973,14 @@
           <a:effectLst/>
           <a:extLst>
             <a:ext uri="{909E8E84-426E-40dd-AFC4-6F175D3DCCD1}">
-              <a14:hiddenFill xmlns:a14="http://schemas.microsoft.com/office/drawing/2010/main" xmlns="">
+              <a14:hiddenFill xmlns="" xmlns:a14="http://schemas.microsoft.com/office/drawing/2010/main">
                 <a:solidFill>
                   <a:schemeClr val="accent1"/>
                 </a:solidFill>
               </a14:hiddenFill>
             </a:ext>
             <a:ext uri="{91240B29-F687-4f45-9708-019B960494DF}">
-              <a14:hiddenLine xmlns:a14="http://schemas.microsoft.com/office/drawing/2010/main" xmlns="" w="9525">
+              <a14:hiddenLine xmlns="" xmlns:a14="http://schemas.microsoft.com/office/drawing/2010/main" w="9525">
                 <a:solidFill>
                   <a:schemeClr val="tx1"/>
                 </a:solidFill>
@@ -10004,7 +9990,7 @@
               </a14:hiddenLine>
             </a:ext>
             <a:ext uri="{AF507438-7753-43e0-B8FC-AC1667EBCBE1}">
-              <a14:hiddenEffects xmlns:a14="http://schemas.microsoft.com/office/drawing/2010/main" xmlns="">
+              <a14:hiddenEffects xmlns="" xmlns:a14="http://schemas.microsoft.com/office/drawing/2010/main">
                 <a:effectLst>
                   <a:outerShdw blurRad="63500" dist="38099" dir="2700000" algn="ctr" rotWithShape="0">
                     <a:schemeClr val="bg2">
@@ -10067,14 +10053,14 @@
           <a:effectLst/>
           <a:extLst>
             <a:ext uri="{909E8E84-426E-40dd-AFC4-6F175D3DCCD1}">
-              <a14:hiddenFill xmlns:a14="http://schemas.microsoft.com/office/drawing/2010/main" xmlns="">
+              <a14:hiddenFill xmlns="" xmlns:a14="http://schemas.microsoft.com/office/drawing/2010/main">
                 <a:solidFill>
                   <a:schemeClr val="accent1"/>
                 </a:solidFill>
               </a14:hiddenFill>
             </a:ext>
             <a:ext uri="{91240B29-F687-4f45-9708-019B960494DF}">
-              <a14:hiddenLine xmlns:a14="http://schemas.microsoft.com/office/drawing/2010/main" xmlns="" w="9525">
+              <a14:hiddenLine xmlns="" xmlns:a14="http://schemas.microsoft.com/office/drawing/2010/main" w="9525">
                 <a:solidFill>
                   <a:schemeClr val="tx1"/>
                 </a:solidFill>
@@ -10084,7 +10070,7 @@
               </a14:hiddenLine>
             </a:ext>
             <a:ext uri="{AF507438-7753-43e0-B8FC-AC1667EBCBE1}">
-              <a14:hiddenEffects xmlns:a14="http://schemas.microsoft.com/office/drawing/2010/main" xmlns="">
+              <a14:hiddenEffects xmlns="" xmlns:a14="http://schemas.microsoft.com/office/drawing/2010/main">
                 <a:effectLst>
                   <a:outerShdw blurRad="63500" dist="38099" dir="2700000" algn="ctr" rotWithShape="0">
                     <a:schemeClr val="bg2">
@@ -10149,12 +10135,12 @@
           <a:effectLst/>
           <a:extLst>
             <a:ext uri="{909E8E84-426E-40dd-AFC4-6F175D3DCCD1}">
-              <a14:hiddenFill xmlns:a14="http://schemas.microsoft.com/office/drawing/2010/main" xmlns="">
+              <a14:hiddenFill xmlns="" xmlns:a14="http://schemas.microsoft.com/office/drawing/2010/main">
                 <a:noFill/>
               </a14:hiddenFill>
             </a:ext>
             <a:ext uri="{AF507438-7753-43e0-B8FC-AC1667EBCBE1}">
-              <a14:hiddenEffects xmlns:a14="http://schemas.microsoft.com/office/drawing/2010/main" xmlns="">
+              <a14:hiddenEffects xmlns="" xmlns:a14="http://schemas.microsoft.com/office/drawing/2010/main">
                 <a:effectLst>
                   <a:outerShdw blurRad="63500" dist="38099" dir="2700000" algn="ctr" rotWithShape="0">
                     <a:schemeClr val="bg2">
@@ -10192,7 +10178,7 @@
         </p:spPr>
         <p:txBody>
           <a:bodyPr>
-            <a:normAutofit fontScale="90000"/>
+            <a:normAutofit/>
           </a:bodyPr>
           <a:lstStyle/>
           <a:p>
@@ -10266,7 +10252,7 @@
             <a:effectLst/>
             <a:extLst>
               <a:ext uri="{AF507438-7753-43e0-B8FC-AC1667EBCBE1}">
-                <a14:hiddenEffects xmlns:a14="http://schemas.microsoft.com/office/drawing/2010/main" xmlns="">
+                <a14:hiddenEffects xmlns="" xmlns:a14="http://schemas.microsoft.com/office/drawing/2010/main">
                   <a:effectLst>
                     <a:outerShdw blurRad="63500" dist="38099" dir="2700000" algn="ctr" rotWithShape="0">
                       <a:schemeClr val="bg2">
@@ -10317,12 +10303,12 @@
             <a:effectLst/>
             <a:extLst>
               <a:ext uri="{909E8E84-426E-40dd-AFC4-6F175D3DCCD1}">
-                <a14:hiddenFill xmlns:a14="http://schemas.microsoft.com/office/drawing/2010/main" xmlns="">
+                <a14:hiddenFill xmlns="" xmlns:a14="http://schemas.microsoft.com/office/drawing/2010/main">
                   <a:noFill/>
                 </a14:hiddenFill>
               </a:ext>
               <a:ext uri="{AF507438-7753-43e0-B8FC-AC1667EBCBE1}">
-                <a14:hiddenEffects xmlns:a14="http://schemas.microsoft.com/office/drawing/2010/main" xmlns="">
+                <a14:hiddenEffects xmlns="" xmlns:a14="http://schemas.microsoft.com/office/drawing/2010/main">
                   <a:effectLst>
                     <a:outerShdw blurRad="63500" dist="38099" dir="2700000" algn="ctr" rotWithShape="0">
                       <a:schemeClr val="bg2">
@@ -10370,12 +10356,12 @@
             <a:effectLst/>
             <a:extLst>
               <a:ext uri="{909E8E84-426E-40dd-AFC4-6F175D3DCCD1}">
-                <a14:hiddenFill xmlns:a14="http://schemas.microsoft.com/office/drawing/2010/main" xmlns="">
+                <a14:hiddenFill xmlns="" xmlns:a14="http://schemas.microsoft.com/office/drawing/2010/main">
                   <a:noFill/>
                 </a14:hiddenFill>
               </a:ext>
               <a:ext uri="{AF507438-7753-43e0-B8FC-AC1667EBCBE1}">
-                <a14:hiddenEffects xmlns:a14="http://schemas.microsoft.com/office/drawing/2010/main" xmlns="">
+                <a14:hiddenEffects xmlns="" xmlns:a14="http://schemas.microsoft.com/office/drawing/2010/main">
                   <a:effectLst>
                     <a:outerShdw blurRad="63500" dist="38099" dir="2700000" algn="ctr" rotWithShape="0">
                       <a:schemeClr val="bg2">
@@ -10717,7 +10703,7 @@
             <a:effectLst/>
             <a:extLst>
               <a:ext uri="{91240B29-F687-4f45-9708-019B960494DF}">
-                <a14:hiddenLine xmlns:a14="http://schemas.microsoft.com/office/drawing/2010/main" xmlns="" w="9525">
+                <a14:hiddenLine xmlns="" xmlns:a14="http://schemas.microsoft.com/office/drawing/2010/main" w="9525">
                   <a:solidFill>
                     <a:schemeClr val="tx1"/>
                   </a:solidFill>
@@ -10727,7 +10713,7 @@
                 </a14:hiddenLine>
               </a:ext>
               <a:ext uri="{AF507438-7753-43e0-B8FC-AC1667EBCBE1}">
-                <a14:hiddenEffects xmlns:a14="http://schemas.microsoft.com/office/drawing/2010/main" xmlns="">
+                <a14:hiddenEffects xmlns="" xmlns:a14="http://schemas.microsoft.com/office/drawing/2010/main">
                   <a:effectLst>
                     <a:outerShdw blurRad="63500" dist="38099" dir="2700000" algn="ctr" rotWithShape="0">
                       <a:schemeClr val="bg2">
@@ -10775,14 +10761,14 @@
             <a:effectLst/>
             <a:extLst>
               <a:ext uri="{909E8E84-426E-40dd-AFC4-6F175D3DCCD1}">
-                <a14:hiddenFill xmlns:a14="http://schemas.microsoft.com/office/drawing/2010/main" xmlns="">
+                <a14:hiddenFill xmlns="" xmlns:a14="http://schemas.microsoft.com/office/drawing/2010/main">
                   <a:solidFill>
                     <a:srgbClr val="FF0000"/>
                   </a:solidFill>
                 </a14:hiddenFill>
               </a:ext>
               <a:ext uri="{AF507438-7753-43e0-B8FC-AC1667EBCBE1}">
-                <a14:hiddenEffects xmlns:a14="http://schemas.microsoft.com/office/drawing/2010/main" xmlns="">
+                <a14:hiddenEffects xmlns="" xmlns:a14="http://schemas.microsoft.com/office/drawing/2010/main">
                   <a:effectLst>
                     <a:outerShdw blurRad="63500" dist="38099" dir="2700000" algn="ctr" rotWithShape="0">
                       <a:schemeClr val="bg2">
@@ -10825,14 +10811,14 @@
             <a:effectLst/>
             <a:extLst>
               <a:ext uri="{909E8E84-426E-40dd-AFC4-6F175D3DCCD1}">
-                <a14:hiddenFill xmlns:a14="http://schemas.microsoft.com/office/drawing/2010/main" xmlns="">
+                <a14:hiddenFill xmlns="" xmlns:a14="http://schemas.microsoft.com/office/drawing/2010/main">
                   <a:solidFill>
                     <a:schemeClr val="accent1"/>
                   </a:solidFill>
                 </a14:hiddenFill>
               </a:ext>
               <a:ext uri="{91240B29-F687-4f45-9708-019B960494DF}">
-                <a14:hiddenLine xmlns:a14="http://schemas.microsoft.com/office/drawing/2010/main" xmlns="" w="9525">
+                <a14:hiddenLine xmlns="" xmlns:a14="http://schemas.microsoft.com/office/drawing/2010/main" w="9525">
                   <a:solidFill>
                     <a:schemeClr val="tx1"/>
                   </a:solidFill>
@@ -10842,7 +10828,7 @@
                 </a14:hiddenLine>
               </a:ext>
               <a:ext uri="{AF507438-7753-43e0-B8FC-AC1667EBCBE1}">
-                <a14:hiddenEffects xmlns:a14="http://schemas.microsoft.com/office/drawing/2010/main" xmlns="">
+                <a14:hiddenEffects xmlns="" xmlns:a14="http://schemas.microsoft.com/office/drawing/2010/main">
                   <a:effectLst>
                     <a:outerShdw blurRad="63500" dist="38099" dir="2700000" algn="ctr" rotWithShape="0">
                       <a:schemeClr val="bg2">
@@ -10896,14 +10882,14 @@
             <a:effectLst/>
             <a:extLst>
               <a:ext uri="{909E8E84-426E-40dd-AFC4-6F175D3DCCD1}">
-                <a14:hiddenFill xmlns:a14="http://schemas.microsoft.com/office/drawing/2010/main" xmlns="">
+                <a14:hiddenFill xmlns="" xmlns:a14="http://schemas.microsoft.com/office/drawing/2010/main">
                   <a:solidFill>
                     <a:schemeClr val="accent1"/>
                   </a:solidFill>
                 </a14:hiddenFill>
               </a:ext>
               <a:ext uri="{91240B29-F687-4f45-9708-019B960494DF}">
-                <a14:hiddenLine xmlns:a14="http://schemas.microsoft.com/office/drawing/2010/main" xmlns="" w="9525">
+                <a14:hiddenLine xmlns="" xmlns:a14="http://schemas.microsoft.com/office/drawing/2010/main" w="9525">
                   <a:solidFill>
                     <a:schemeClr val="tx1"/>
                   </a:solidFill>
@@ -10913,7 +10899,7 @@
                 </a14:hiddenLine>
               </a:ext>
               <a:ext uri="{AF507438-7753-43e0-B8FC-AC1667EBCBE1}">
-                <a14:hiddenEffects xmlns:a14="http://schemas.microsoft.com/office/drawing/2010/main" xmlns="">
+                <a14:hiddenEffects xmlns="" xmlns:a14="http://schemas.microsoft.com/office/drawing/2010/main">
                   <a:effectLst>
                     <a:outerShdw blurRad="63500" dist="38099" dir="2700000" algn="ctr" rotWithShape="0">
                       <a:schemeClr val="bg2">
@@ -11028,7 +11014,7 @@
             <a:effectLst/>
             <a:extLst>
               <a:ext uri="{91240B29-F687-4f45-9708-019B960494DF}">
-                <a14:hiddenLine xmlns:a14="http://schemas.microsoft.com/office/drawing/2010/main" xmlns="" w="9525">
+                <a14:hiddenLine xmlns="" xmlns:a14="http://schemas.microsoft.com/office/drawing/2010/main" w="9525">
                   <a:solidFill>
                     <a:schemeClr val="tx1"/>
                   </a:solidFill>
@@ -11038,7 +11024,7 @@
                 </a14:hiddenLine>
               </a:ext>
               <a:ext uri="{AF507438-7753-43e0-B8FC-AC1667EBCBE1}">
-                <a14:hiddenEffects xmlns:a14="http://schemas.microsoft.com/office/drawing/2010/main" xmlns="">
+                <a14:hiddenEffects xmlns="" xmlns:a14="http://schemas.microsoft.com/office/drawing/2010/main">
                   <a:effectLst>
                     <a:outerShdw blurRad="63500" dist="38099" dir="2700000" algn="ctr" rotWithShape="0">
                       <a:schemeClr val="bg2">
@@ -11086,14 +11072,14 @@
             <a:effectLst/>
             <a:extLst>
               <a:ext uri="{909E8E84-426E-40dd-AFC4-6F175D3DCCD1}">
-                <a14:hiddenFill xmlns:a14="http://schemas.microsoft.com/office/drawing/2010/main" xmlns="">
+                <a14:hiddenFill xmlns="" xmlns:a14="http://schemas.microsoft.com/office/drawing/2010/main">
                   <a:solidFill>
                     <a:srgbClr val="FF0000"/>
                   </a:solidFill>
                 </a14:hiddenFill>
               </a:ext>
               <a:ext uri="{AF507438-7753-43e0-B8FC-AC1667EBCBE1}">
-                <a14:hiddenEffects xmlns:a14="http://schemas.microsoft.com/office/drawing/2010/main" xmlns="">
+                <a14:hiddenEffects xmlns="" xmlns:a14="http://schemas.microsoft.com/office/drawing/2010/main">
                   <a:effectLst>
                     <a:outerShdw blurRad="63500" dist="38099" dir="2700000" algn="ctr" rotWithShape="0">
                       <a:schemeClr val="bg2">
@@ -11141,12 +11127,12 @@
             <a:effectLst/>
             <a:extLst>
               <a:ext uri="{909E8E84-426E-40dd-AFC4-6F175D3DCCD1}">
-                <a14:hiddenFill xmlns:a14="http://schemas.microsoft.com/office/drawing/2010/main" xmlns="">
+                <a14:hiddenFill xmlns="" xmlns:a14="http://schemas.microsoft.com/office/drawing/2010/main">
                   <a:noFill/>
                 </a14:hiddenFill>
               </a:ext>
               <a:ext uri="{AF507438-7753-43e0-B8FC-AC1667EBCBE1}">
-                <a14:hiddenEffects xmlns:a14="http://schemas.microsoft.com/office/drawing/2010/main" xmlns="">
+                <a14:hiddenEffects xmlns="" xmlns:a14="http://schemas.microsoft.com/office/drawing/2010/main">
                   <a:effectLst>
                     <a:outerShdw blurRad="63500" dist="38099" dir="2700000" algn="ctr" rotWithShape="0">
                       <a:schemeClr val="bg2">
@@ -11194,12 +11180,12 @@
             <a:effectLst/>
             <a:extLst>
               <a:ext uri="{909E8E84-426E-40dd-AFC4-6F175D3DCCD1}">
-                <a14:hiddenFill xmlns:a14="http://schemas.microsoft.com/office/drawing/2010/main" xmlns="">
+                <a14:hiddenFill xmlns="" xmlns:a14="http://schemas.microsoft.com/office/drawing/2010/main">
                   <a:noFill/>
                 </a14:hiddenFill>
               </a:ext>
               <a:ext uri="{AF507438-7753-43e0-B8FC-AC1667EBCBE1}">
-                <a14:hiddenEffects xmlns:a14="http://schemas.microsoft.com/office/drawing/2010/main" xmlns="">
+                <a14:hiddenEffects xmlns="" xmlns:a14="http://schemas.microsoft.com/office/drawing/2010/main">
                   <a:effectLst>
                     <a:outerShdw blurRad="63500" dist="38099" dir="2700000" algn="ctr" rotWithShape="0">
                       <a:schemeClr val="bg2">
@@ -11242,14 +11228,14 @@
             <a:effectLst/>
             <a:extLst>
               <a:ext uri="{909E8E84-426E-40dd-AFC4-6F175D3DCCD1}">
-                <a14:hiddenFill xmlns:a14="http://schemas.microsoft.com/office/drawing/2010/main" xmlns="">
+                <a14:hiddenFill xmlns="" xmlns:a14="http://schemas.microsoft.com/office/drawing/2010/main">
                   <a:solidFill>
                     <a:schemeClr val="accent1"/>
                   </a:solidFill>
                 </a14:hiddenFill>
               </a:ext>
               <a:ext uri="{91240B29-F687-4f45-9708-019B960494DF}">
-                <a14:hiddenLine xmlns:a14="http://schemas.microsoft.com/office/drawing/2010/main" xmlns="" w="9525">
+                <a14:hiddenLine xmlns="" xmlns:a14="http://schemas.microsoft.com/office/drawing/2010/main" w="9525">
                   <a:solidFill>
                     <a:schemeClr val="tx1"/>
                   </a:solidFill>
@@ -11259,7 +11245,7 @@
                 </a14:hiddenLine>
               </a:ext>
               <a:ext uri="{AF507438-7753-43e0-B8FC-AC1667EBCBE1}">
-                <a14:hiddenEffects xmlns:a14="http://schemas.microsoft.com/office/drawing/2010/main" xmlns="">
+                <a14:hiddenEffects xmlns="" xmlns:a14="http://schemas.microsoft.com/office/drawing/2010/main">
                   <a:effectLst>
                     <a:outerShdw blurRad="63500" dist="38099" dir="2700000" algn="ctr" rotWithShape="0">
                       <a:schemeClr val="bg2">
@@ -11335,12 +11321,12 @@
             <a:effectLst/>
             <a:extLst>
               <a:ext uri="{909E8E84-426E-40dd-AFC4-6F175D3DCCD1}">
-                <a14:hiddenFill xmlns:a14="http://schemas.microsoft.com/office/drawing/2010/main" xmlns="">
+                <a14:hiddenFill xmlns="" xmlns:a14="http://schemas.microsoft.com/office/drawing/2010/main">
                   <a:noFill/>
                 </a14:hiddenFill>
               </a:ext>
               <a:ext uri="{AF507438-7753-43e0-B8FC-AC1667EBCBE1}">
-                <a14:hiddenEffects xmlns:a14="http://schemas.microsoft.com/office/drawing/2010/main" xmlns="">
+                <a14:hiddenEffects xmlns="" xmlns:a14="http://schemas.microsoft.com/office/drawing/2010/main">
                   <a:effectLst>
                     <a:outerShdw blurRad="63500" dist="38099" dir="2700000" algn="ctr" rotWithShape="0">
                       <a:schemeClr val="bg2">
@@ -11388,12 +11374,12 @@
             <a:effectLst/>
             <a:extLst>
               <a:ext uri="{909E8E84-426E-40dd-AFC4-6F175D3DCCD1}">
-                <a14:hiddenFill xmlns:a14="http://schemas.microsoft.com/office/drawing/2010/main" xmlns="">
+                <a14:hiddenFill xmlns="" xmlns:a14="http://schemas.microsoft.com/office/drawing/2010/main">
                   <a:noFill/>
                 </a14:hiddenFill>
               </a:ext>
               <a:ext uri="{AF507438-7753-43e0-B8FC-AC1667EBCBE1}">
-                <a14:hiddenEffects xmlns:a14="http://schemas.microsoft.com/office/drawing/2010/main" xmlns="">
+                <a14:hiddenEffects xmlns="" xmlns:a14="http://schemas.microsoft.com/office/drawing/2010/main">
                   <a:effectLst>
                     <a:outerShdw blurRad="63500" dist="38099" dir="2700000" algn="ctr" rotWithShape="0">
                       <a:schemeClr val="bg2">
@@ -11436,14 +11422,14 @@
             <a:effectLst/>
             <a:extLst>
               <a:ext uri="{909E8E84-426E-40dd-AFC4-6F175D3DCCD1}">
-                <a14:hiddenFill xmlns:a14="http://schemas.microsoft.com/office/drawing/2010/main" xmlns="">
+                <a14:hiddenFill xmlns="" xmlns:a14="http://schemas.microsoft.com/office/drawing/2010/main">
                   <a:solidFill>
                     <a:schemeClr val="accent1"/>
                   </a:solidFill>
                 </a14:hiddenFill>
               </a:ext>
               <a:ext uri="{91240B29-F687-4f45-9708-019B960494DF}">
-                <a14:hiddenLine xmlns:a14="http://schemas.microsoft.com/office/drawing/2010/main" xmlns="" w="9525">
+                <a14:hiddenLine xmlns="" xmlns:a14="http://schemas.microsoft.com/office/drawing/2010/main" w="9525">
                   <a:solidFill>
                     <a:schemeClr val="tx1"/>
                   </a:solidFill>
@@ -11453,7 +11439,7 @@
                 </a14:hiddenLine>
               </a:ext>
               <a:ext uri="{AF507438-7753-43e0-B8FC-AC1667EBCBE1}">
-                <a14:hiddenEffects xmlns:a14="http://schemas.microsoft.com/office/drawing/2010/main" xmlns="">
+                <a14:hiddenEffects xmlns="" xmlns:a14="http://schemas.microsoft.com/office/drawing/2010/main">
                   <a:effectLst>
                     <a:outerShdw blurRad="63500" dist="38099" dir="2700000" algn="ctr" rotWithShape="0">
                       <a:schemeClr val="bg2">
@@ -11509,12 +11495,12 @@
             <a:effectLst/>
             <a:extLst>
               <a:ext uri="{909E8E84-426E-40dd-AFC4-6F175D3DCCD1}">
-                <a14:hiddenFill xmlns:a14="http://schemas.microsoft.com/office/drawing/2010/main" xmlns="">
+                <a14:hiddenFill xmlns="" xmlns:a14="http://schemas.microsoft.com/office/drawing/2010/main">
                   <a:noFill/>
                 </a14:hiddenFill>
               </a:ext>
               <a:ext uri="{AF507438-7753-43e0-B8FC-AC1667EBCBE1}">
-                <a14:hiddenEffects xmlns:a14="http://schemas.microsoft.com/office/drawing/2010/main" xmlns="">
+                <a14:hiddenEffects xmlns="" xmlns:a14="http://schemas.microsoft.com/office/drawing/2010/main">
                   <a:effectLst>
                     <a:outerShdw blurRad="63500" dist="38099" dir="2700000" algn="ctr" rotWithShape="0">
                       <a:schemeClr val="bg2">
@@ -11579,12 +11565,12 @@
             <a:effectLst/>
             <a:extLst>
               <a:ext uri="{909E8E84-426E-40dd-AFC4-6F175D3DCCD1}">
-                <a14:hiddenFill xmlns:a14="http://schemas.microsoft.com/office/drawing/2010/main" xmlns="">
+                <a14:hiddenFill xmlns="" xmlns:a14="http://schemas.microsoft.com/office/drawing/2010/main">
                   <a:noFill/>
                 </a14:hiddenFill>
               </a:ext>
               <a:ext uri="{AF507438-7753-43e0-B8FC-AC1667EBCBE1}">
-                <a14:hiddenEffects xmlns:a14="http://schemas.microsoft.com/office/drawing/2010/main" xmlns="">
+                <a14:hiddenEffects xmlns="" xmlns:a14="http://schemas.microsoft.com/office/drawing/2010/main">
                   <a:effectLst>
                     <a:outerShdw blurRad="63500" dist="38099" dir="2700000" algn="ctr" rotWithShape="0">
                       <a:schemeClr val="bg2">
@@ -11632,12 +11618,12 @@
             <a:effectLst/>
             <a:extLst>
               <a:ext uri="{909E8E84-426E-40dd-AFC4-6F175D3DCCD1}">
-                <a14:hiddenFill xmlns:a14="http://schemas.microsoft.com/office/drawing/2010/main" xmlns="">
+                <a14:hiddenFill xmlns="" xmlns:a14="http://schemas.microsoft.com/office/drawing/2010/main">
                   <a:noFill/>
                 </a14:hiddenFill>
               </a:ext>
               <a:ext uri="{AF507438-7753-43e0-B8FC-AC1667EBCBE1}">
-                <a14:hiddenEffects xmlns:a14="http://schemas.microsoft.com/office/drawing/2010/main" xmlns="">
+                <a14:hiddenEffects xmlns="" xmlns:a14="http://schemas.microsoft.com/office/drawing/2010/main">
                   <a:effectLst>
                     <a:outerShdw blurRad="63500" dist="38099" dir="2700000" algn="ctr" rotWithShape="0">
                       <a:schemeClr val="bg2">
@@ -11680,14 +11666,14 @@
             <a:effectLst/>
             <a:extLst>
               <a:ext uri="{909E8E84-426E-40dd-AFC4-6F175D3DCCD1}">
-                <a14:hiddenFill xmlns:a14="http://schemas.microsoft.com/office/drawing/2010/main" xmlns="">
+                <a14:hiddenFill xmlns="" xmlns:a14="http://schemas.microsoft.com/office/drawing/2010/main">
                   <a:solidFill>
                     <a:schemeClr val="accent1"/>
                   </a:solidFill>
                 </a14:hiddenFill>
               </a:ext>
               <a:ext uri="{91240B29-F687-4f45-9708-019B960494DF}">
-                <a14:hiddenLine xmlns:a14="http://schemas.microsoft.com/office/drawing/2010/main" xmlns="" w="9525">
+                <a14:hiddenLine xmlns="" xmlns:a14="http://schemas.microsoft.com/office/drawing/2010/main" w="9525">
                   <a:solidFill>
                     <a:schemeClr val="tx1"/>
                   </a:solidFill>
@@ -11697,7 +11683,7 @@
                 </a14:hiddenLine>
               </a:ext>
               <a:ext uri="{AF507438-7753-43e0-B8FC-AC1667EBCBE1}">
-                <a14:hiddenEffects xmlns:a14="http://schemas.microsoft.com/office/drawing/2010/main" xmlns="">
+                <a14:hiddenEffects xmlns="" xmlns:a14="http://schemas.microsoft.com/office/drawing/2010/main">
                   <a:effectLst>
                     <a:outerShdw blurRad="63500" dist="38099" dir="2700000" algn="ctr" rotWithShape="0">
                       <a:schemeClr val="bg2">
@@ -11753,12 +11739,12 @@
             <a:effectLst/>
             <a:extLst>
               <a:ext uri="{909E8E84-426E-40dd-AFC4-6F175D3DCCD1}">
-                <a14:hiddenFill xmlns:a14="http://schemas.microsoft.com/office/drawing/2010/main" xmlns="">
+                <a14:hiddenFill xmlns="" xmlns:a14="http://schemas.microsoft.com/office/drawing/2010/main">
                   <a:noFill/>
                 </a14:hiddenFill>
               </a:ext>
               <a:ext uri="{AF507438-7753-43e0-B8FC-AC1667EBCBE1}">
-                <a14:hiddenEffects xmlns:a14="http://schemas.microsoft.com/office/drawing/2010/main" xmlns="">
+                <a14:hiddenEffects xmlns="" xmlns:a14="http://schemas.microsoft.com/office/drawing/2010/main">
                   <a:effectLst>
                     <a:outerShdw blurRad="63500" dist="38099" dir="2700000" algn="ctr" rotWithShape="0">
                       <a:schemeClr val="bg2">
@@ -11825,7 +11811,7 @@
             <a:effectLst/>
             <a:extLst>
               <a:ext uri="{AF507438-7753-43e0-B8FC-AC1667EBCBE1}">
-                <a14:hiddenEffects xmlns:a14="http://schemas.microsoft.com/office/drawing/2010/main" xmlns="">
+                <a14:hiddenEffects xmlns="" xmlns:a14="http://schemas.microsoft.com/office/drawing/2010/main">
                   <a:effectLst>
                     <a:outerShdw blurRad="63500" dist="38099" dir="2700000" algn="ctr" rotWithShape="0">
                       <a:schemeClr val="bg2">
@@ -11868,14 +11854,14 @@
             <a:effectLst/>
             <a:extLst>
               <a:ext uri="{909E8E84-426E-40dd-AFC4-6F175D3DCCD1}">
-                <a14:hiddenFill xmlns:a14="http://schemas.microsoft.com/office/drawing/2010/main" xmlns="">
+                <a14:hiddenFill xmlns="" xmlns:a14="http://schemas.microsoft.com/office/drawing/2010/main">
                   <a:solidFill>
                     <a:schemeClr val="accent1"/>
                   </a:solidFill>
                 </a14:hiddenFill>
               </a:ext>
               <a:ext uri="{91240B29-F687-4f45-9708-019B960494DF}">
-                <a14:hiddenLine xmlns:a14="http://schemas.microsoft.com/office/drawing/2010/main" xmlns="" w="9525">
+                <a14:hiddenLine xmlns="" xmlns:a14="http://schemas.microsoft.com/office/drawing/2010/main" w="9525">
                   <a:solidFill>
                     <a:schemeClr val="tx1"/>
                   </a:solidFill>
@@ -11885,7 +11871,7 @@
                 </a14:hiddenLine>
               </a:ext>
               <a:ext uri="{AF507438-7753-43e0-B8FC-AC1667EBCBE1}">
-                <a14:hiddenEffects xmlns:a14="http://schemas.microsoft.com/office/drawing/2010/main" xmlns="">
+                <a14:hiddenEffects xmlns="" xmlns:a14="http://schemas.microsoft.com/office/drawing/2010/main">
                   <a:effectLst>
                     <a:outerShdw blurRad="63500" dist="38099" dir="2700000" algn="ctr" rotWithShape="0">
                       <a:schemeClr val="bg2">
@@ -12296,7 +12282,7 @@
             <a:effectLst/>
             <a:extLst>
               <a:ext uri="{91240B29-F687-4f45-9708-019B960494DF}">
-                <a14:hiddenLine xmlns:a14="http://schemas.microsoft.com/office/drawing/2010/main" xmlns="" w="9525">
+                <a14:hiddenLine xmlns="" xmlns:a14="http://schemas.microsoft.com/office/drawing/2010/main" w="9525">
                   <a:solidFill>
                     <a:schemeClr val="tx1"/>
                   </a:solidFill>
@@ -12306,7 +12292,7 @@
                 </a14:hiddenLine>
               </a:ext>
               <a:ext uri="{AF507438-7753-43e0-B8FC-AC1667EBCBE1}">
-                <a14:hiddenEffects xmlns:a14="http://schemas.microsoft.com/office/drawing/2010/main" xmlns="">
+                <a14:hiddenEffects xmlns="" xmlns:a14="http://schemas.microsoft.com/office/drawing/2010/main">
                   <a:effectLst>
                     <a:outerShdw blurRad="63500" dist="38099" dir="2700000" algn="ctr" rotWithShape="0">
                       <a:schemeClr val="bg2">
@@ -12356,7 +12342,7 @@
             <a:effectLst/>
             <a:extLst>
               <a:ext uri="{AF507438-7753-43e0-B8FC-AC1667EBCBE1}">
-                <a14:hiddenEffects xmlns:a14="http://schemas.microsoft.com/office/drawing/2010/main" xmlns="">
+                <a14:hiddenEffects xmlns="" xmlns:a14="http://schemas.microsoft.com/office/drawing/2010/main">
                   <a:effectLst>
                     <a:outerShdw blurRad="63500" dist="38099" dir="2700000" algn="ctr" rotWithShape="0">
                       <a:schemeClr val="bg2">
@@ -12580,7 +12566,7 @@
             <a:effectLst/>
             <a:extLst>
               <a:ext uri="{91240B29-F687-4f45-9708-019B960494DF}">
-                <a14:hiddenLine xmlns:a14="http://schemas.microsoft.com/office/drawing/2010/main" xmlns="" w="9525">
+                <a14:hiddenLine xmlns="" xmlns:a14="http://schemas.microsoft.com/office/drawing/2010/main" w="9525">
                   <a:solidFill>
                     <a:schemeClr val="tx1"/>
                   </a:solidFill>
@@ -12590,7 +12576,7 @@
                 </a14:hiddenLine>
               </a:ext>
               <a:ext uri="{AF507438-7753-43e0-B8FC-AC1667EBCBE1}">
-                <a14:hiddenEffects xmlns:a14="http://schemas.microsoft.com/office/drawing/2010/main" xmlns="">
+                <a14:hiddenEffects xmlns="" xmlns:a14="http://schemas.microsoft.com/office/drawing/2010/main">
                   <a:effectLst>
                     <a:outerShdw blurRad="63500" dist="38099" dir="2700000" algn="ctr" rotWithShape="0">
                       <a:schemeClr val="bg2">
@@ -12638,12 +12624,12 @@
             <a:effectLst/>
             <a:extLst>
               <a:ext uri="{909E8E84-426E-40dd-AFC4-6F175D3DCCD1}">
-                <a14:hiddenFill xmlns:a14="http://schemas.microsoft.com/office/drawing/2010/main" xmlns="">
+                <a14:hiddenFill xmlns="" xmlns:a14="http://schemas.microsoft.com/office/drawing/2010/main">
                   <a:noFill/>
                 </a14:hiddenFill>
               </a:ext>
               <a:ext uri="{AF507438-7753-43e0-B8FC-AC1667EBCBE1}">
-                <a14:hiddenEffects xmlns:a14="http://schemas.microsoft.com/office/drawing/2010/main" xmlns="">
+                <a14:hiddenEffects xmlns="" xmlns:a14="http://schemas.microsoft.com/office/drawing/2010/main">
                   <a:effectLst>
                     <a:outerShdw blurRad="63500" dist="38099" dir="2700000" algn="ctr" rotWithShape="0">
                       <a:schemeClr val="bg2">
@@ -12691,14 +12677,14 @@
             <a:effectLst/>
             <a:extLst>
               <a:ext uri="{909E8E84-426E-40dd-AFC4-6F175D3DCCD1}">
-                <a14:hiddenFill xmlns:a14="http://schemas.microsoft.com/office/drawing/2010/main" xmlns="">
+                <a14:hiddenFill xmlns="" xmlns:a14="http://schemas.microsoft.com/office/drawing/2010/main">
                   <a:solidFill>
                     <a:schemeClr val="accent1"/>
                   </a:solidFill>
                 </a14:hiddenFill>
               </a:ext>
               <a:ext uri="{AF507438-7753-43e0-B8FC-AC1667EBCBE1}">
-                <a14:hiddenEffects xmlns:a14="http://schemas.microsoft.com/office/drawing/2010/main" xmlns="">
+                <a14:hiddenEffects xmlns="" xmlns:a14="http://schemas.microsoft.com/office/drawing/2010/main">
                   <a:effectLst>
                     <a:outerShdw blurRad="63500" dist="38099" dir="2700000" algn="ctr" rotWithShape="0">
                       <a:schemeClr val="bg2">
@@ -12741,14 +12727,14 @@
             <a:effectLst/>
             <a:extLst>
               <a:ext uri="{909E8E84-426E-40dd-AFC4-6F175D3DCCD1}">
-                <a14:hiddenFill xmlns:a14="http://schemas.microsoft.com/office/drawing/2010/main" xmlns="">
+                <a14:hiddenFill xmlns="" xmlns:a14="http://schemas.microsoft.com/office/drawing/2010/main">
                   <a:solidFill>
                     <a:schemeClr val="accent1"/>
                   </a:solidFill>
                 </a14:hiddenFill>
               </a:ext>
               <a:ext uri="{91240B29-F687-4f45-9708-019B960494DF}">
-                <a14:hiddenLine xmlns:a14="http://schemas.microsoft.com/office/drawing/2010/main" xmlns="" w="9525">
+                <a14:hiddenLine xmlns="" xmlns:a14="http://schemas.microsoft.com/office/drawing/2010/main" w="9525">
                   <a:solidFill>
                     <a:schemeClr val="tx1"/>
                   </a:solidFill>
@@ -12758,7 +12744,7 @@
                 </a14:hiddenLine>
               </a:ext>
               <a:ext uri="{AF507438-7753-43e0-B8FC-AC1667EBCBE1}">
-                <a14:hiddenEffects xmlns:a14="http://schemas.microsoft.com/office/drawing/2010/main" xmlns="">
+                <a14:hiddenEffects xmlns="" xmlns:a14="http://schemas.microsoft.com/office/drawing/2010/main">
                   <a:effectLst>
                     <a:outerShdw blurRad="63500" dist="38099" dir="2700000" algn="ctr" rotWithShape="0">
                       <a:schemeClr val="bg2">
@@ -12812,14 +12798,14 @@
             <a:effectLst/>
             <a:extLst>
               <a:ext uri="{909E8E84-426E-40dd-AFC4-6F175D3DCCD1}">
-                <a14:hiddenFill xmlns:a14="http://schemas.microsoft.com/office/drawing/2010/main" xmlns="">
+                <a14:hiddenFill xmlns="" xmlns:a14="http://schemas.microsoft.com/office/drawing/2010/main">
                   <a:solidFill>
                     <a:schemeClr val="accent1"/>
                   </a:solidFill>
                 </a14:hiddenFill>
               </a:ext>
               <a:ext uri="{91240B29-F687-4f45-9708-019B960494DF}">
-                <a14:hiddenLine xmlns:a14="http://schemas.microsoft.com/office/drawing/2010/main" xmlns="" w="9525">
+                <a14:hiddenLine xmlns="" xmlns:a14="http://schemas.microsoft.com/office/drawing/2010/main" w="9525">
                   <a:solidFill>
                     <a:schemeClr val="tx1"/>
                   </a:solidFill>
@@ -12829,7 +12815,7 @@
                 </a14:hiddenLine>
               </a:ext>
               <a:ext uri="{AF507438-7753-43e0-B8FC-AC1667EBCBE1}">
-                <a14:hiddenEffects xmlns:a14="http://schemas.microsoft.com/office/drawing/2010/main" xmlns="">
+                <a14:hiddenEffects xmlns="" xmlns:a14="http://schemas.microsoft.com/office/drawing/2010/main">
                   <a:effectLst>
                     <a:outerShdw blurRad="63500" dist="38099" dir="2700000" algn="ctr" rotWithShape="0">
                       <a:schemeClr val="bg2">
@@ -12888,12 +12874,12 @@
             <a:effectLst/>
             <a:extLst>
               <a:ext uri="{909E8E84-426E-40dd-AFC4-6F175D3DCCD1}">
-                <a14:hiddenFill xmlns:a14="http://schemas.microsoft.com/office/drawing/2010/main" xmlns="">
+                <a14:hiddenFill xmlns="" xmlns:a14="http://schemas.microsoft.com/office/drawing/2010/main">
                   <a:noFill/>
                 </a14:hiddenFill>
               </a:ext>
               <a:ext uri="{AF507438-7753-43e0-B8FC-AC1667EBCBE1}">
-                <a14:hiddenEffects xmlns:a14="http://schemas.microsoft.com/office/drawing/2010/main" xmlns="">
+                <a14:hiddenEffects xmlns="" xmlns:a14="http://schemas.microsoft.com/office/drawing/2010/main">
                   <a:effectLst>
                     <a:outerShdw blurRad="63500" dist="38099" dir="2700000" algn="ctr" rotWithShape="0">
                       <a:schemeClr val="bg2">
@@ -12941,12 +12927,12 @@
             <a:effectLst/>
             <a:extLst>
               <a:ext uri="{909E8E84-426E-40dd-AFC4-6F175D3DCCD1}">
-                <a14:hiddenFill xmlns:a14="http://schemas.microsoft.com/office/drawing/2010/main" xmlns="">
+                <a14:hiddenFill xmlns="" xmlns:a14="http://schemas.microsoft.com/office/drawing/2010/main">
                   <a:noFill/>
                 </a14:hiddenFill>
               </a:ext>
               <a:ext uri="{AF507438-7753-43e0-B8FC-AC1667EBCBE1}">
-                <a14:hiddenEffects xmlns:a14="http://schemas.microsoft.com/office/drawing/2010/main" xmlns="">
+                <a14:hiddenEffects xmlns="" xmlns:a14="http://schemas.microsoft.com/office/drawing/2010/main">
                   <a:effectLst>
                     <a:outerShdw blurRad="63500" dist="38099" dir="2700000" algn="ctr" rotWithShape="0">
                       <a:schemeClr val="bg2">
@@ -12994,14 +12980,14 @@
             <a:effectLst/>
             <a:extLst>
               <a:ext uri="{909E8E84-426E-40dd-AFC4-6F175D3DCCD1}">
-                <a14:hiddenFill xmlns:a14="http://schemas.microsoft.com/office/drawing/2010/main" xmlns="">
+                <a14:hiddenFill xmlns="" xmlns:a14="http://schemas.microsoft.com/office/drawing/2010/main">
                   <a:solidFill>
                     <a:srgbClr val="FF0000"/>
                   </a:solidFill>
                 </a14:hiddenFill>
               </a:ext>
               <a:ext uri="{AF507438-7753-43e0-B8FC-AC1667EBCBE1}">
-                <a14:hiddenEffects xmlns:a14="http://schemas.microsoft.com/office/drawing/2010/main" xmlns="">
+                <a14:hiddenEffects xmlns="" xmlns:a14="http://schemas.microsoft.com/office/drawing/2010/main">
                   <a:effectLst>
                     <a:outerShdw blurRad="63500" dist="38099" dir="2700000" algn="ctr" rotWithShape="0">
                       <a:schemeClr val="bg2">
@@ -13044,14 +13030,14 @@
             <a:effectLst/>
             <a:extLst>
               <a:ext uri="{909E8E84-426E-40dd-AFC4-6F175D3DCCD1}">
-                <a14:hiddenFill xmlns:a14="http://schemas.microsoft.com/office/drawing/2010/main" xmlns="">
+                <a14:hiddenFill xmlns="" xmlns:a14="http://schemas.microsoft.com/office/drawing/2010/main">
                   <a:solidFill>
                     <a:schemeClr val="accent1"/>
                   </a:solidFill>
                 </a14:hiddenFill>
               </a:ext>
               <a:ext uri="{91240B29-F687-4f45-9708-019B960494DF}">
-                <a14:hiddenLine xmlns:a14="http://schemas.microsoft.com/office/drawing/2010/main" xmlns="" w="9525">
+                <a14:hiddenLine xmlns="" xmlns:a14="http://schemas.microsoft.com/office/drawing/2010/main" w="9525">
                   <a:solidFill>
                     <a:schemeClr val="tx1"/>
                   </a:solidFill>
@@ -13061,7 +13047,7 @@
                 </a14:hiddenLine>
               </a:ext>
               <a:ext uri="{AF507438-7753-43e0-B8FC-AC1667EBCBE1}">
-                <a14:hiddenEffects xmlns:a14="http://schemas.microsoft.com/office/drawing/2010/main" xmlns="">
+                <a14:hiddenEffects xmlns="" xmlns:a14="http://schemas.microsoft.com/office/drawing/2010/main">
                   <a:effectLst>
                     <a:outerShdw blurRad="63500" dist="38099" dir="2700000" algn="ctr" rotWithShape="0">
                       <a:schemeClr val="bg2">
@@ -13139,7 +13125,7 @@
             <a:effectLst/>
             <a:extLst>
               <a:ext uri="{AF507438-7753-43e0-B8FC-AC1667EBCBE1}">
-                <a14:hiddenEffects xmlns:a14="http://schemas.microsoft.com/office/drawing/2010/main" xmlns="">
+                <a14:hiddenEffects xmlns="" xmlns:a14="http://schemas.microsoft.com/office/drawing/2010/main">
                   <a:effectLst>
                     <a:outerShdw blurRad="63500" dist="38099" dir="2700000" algn="ctr" rotWithShape="0">
                       <a:schemeClr val="bg2">
@@ -13182,14 +13168,14 @@
             <a:effectLst/>
             <a:extLst>
               <a:ext uri="{909E8E84-426E-40dd-AFC4-6F175D3DCCD1}">
-                <a14:hiddenFill xmlns:a14="http://schemas.microsoft.com/office/drawing/2010/main" xmlns="">
+                <a14:hiddenFill xmlns="" xmlns:a14="http://schemas.microsoft.com/office/drawing/2010/main">
                   <a:solidFill>
                     <a:schemeClr val="accent1"/>
                   </a:solidFill>
                 </a14:hiddenFill>
               </a:ext>
               <a:ext uri="{91240B29-F687-4f45-9708-019B960494DF}">
-                <a14:hiddenLine xmlns:a14="http://schemas.microsoft.com/office/drawing/2010/main" xmlns="" w="9525">
+                <a14:hiddenLine xmlns="" xmlns:a14="http://schemas.microsoft.com/office/drawing/2010/main" w="9525">
                   <a:solidFill>
                     <a:schemeClr val="tx1"/>
                   </a:solidFill>
@@ -13199,7 +13185,7 @@
                 </a14:hiddenLine>
               </a:ext>
               <a:ext uri="{AF507438-7753-43e0-B8FC-AC1667EBCBE1}">
-                <a14:hiddenEffects xmlns:a14="http://schemas.microsoft.com/office/drawing/2010/main" xmlns="">
+                <a14:hiddenEffects xmlns="" xmlns:a14="http://schemas.microsoft.com/office/drawing/2010/main">
                   <a:effectLst>
                     <a:outerShdw blurRad="63500" dist="38099" dir="2700000" algn="ctr" rotWithShape="0">
                       <a:schemeClr val="bg2">
@@ -13378,7 +13364,7 @@
             <a:effectLst/>
             <a:extLst>
               <a:ext uri="{91240B29-F687-4f45-9708-019B960494DF}">
-                <a14:hiddenLine xmlns:a14="http://schemas.microsoft.com/office/drawing/2010/main" xmlns="" w="9525">
+                <a14:hiddenLine xmlns="" xmlns:a14="http://schemas.microsoft.com/office/drawing/2010/main" w="9525">
                   <a:solidFill>
                     <a:schemeClr val="tx1"/>
                   </a:solidFill>
@@ -13388,7 +13374,7 @@
                 </a14:hiddenLine>
               </a:ext>
               <a:ext uri="{AF507438-7753-43e0-B8FC-AC1667EBCBE1}">
-                <a14:hiddenEffects xmlns:a14="http://schemas.microsoft.com/office/drawing/2010/main" xmlns="">
+                <a14:hiddenEffects xmlns="" xmlns:a14="http://schemas.microsoft.com/office/drawing/2010/main">
                   <a:effectLst>
                     <a:outerShdw blurRad="63500" dist="38099" dir="2700000" algn="ctr" rotWithShape="0">
                       <a:schemeClr val="bg2">
@@ -13436,12 +13422,12 @@
             <a:effectLst/>
             <a:extLst>
               <a:ext uri="{909E8E84-426E-40dd-AFC4-6F175D3DCCD1}">
-                <a14:hiddenFill xmlns:a14="http://schemas.microsoft.com/office/drawing/2010/main" xmlns="">
+                <a14:hiddenFill xmlns="" xmlns:a14="http://schemas.microsoft.com/office/drawing/2010/main">
                   <a:noFill/>
                 </a14:hiddenFill>
               </a:ext>
               <a:ext uri="{AF507438-7753-43e0-B8FC-AC1667EBCBE1}">
-                <a14:hiddenEffects xmlns:a14="http://schemas.microsoft.com/office/drawing/2010/main" xmlns="">
+                <a14:hiddenEffects xmlns="" xmlns:a14="http://schemas.microsoft.com/office/drawing/2010/main">
                   <a:effectLst>
                     <a:outerShdw blurRad="63500" dist="38099" dir="2700000" algn="ctr" rotWithShape="0">
                       <a:schemeClr val="bg2">
@@ -13489,12 +13475,12 @@
             <a:effectLst/>
             <a:extLst>
               <a:ext uri="{909E8E84-426E-40dd-AFC4-6F175D3DCCD1}">
-                <a14:hiddenFill xmlns:a14="http://schemas.microsoft.com/office/drawing/2010/main" xmlns="">
+                <a14:hiddenFill xmlns="" xmlns:a14="http://schemas.microsoft.com/office/drawing/2010/main">
                   <a:noFill/>
                 </a14:hiddenFill>
               </a:ext>
               <a:ext uri="{AF507438-7753-43e0-B8FC-AC1667EBCBE1}">
-                <a14:hiddenEffects xmlns:a14="http://schemas.microsoft.com/office/drawing/2010/main" xmlns="">
+                <a14:hiddenEffects xmlns="" xmlns:a14="http://schemas.microsoft.com/office/drawing/2010/main">
                   <a:effectLst>
                     <a:outerShdw blurRad="63500" dist="38099" dir="2700000" algn="ctr" rotWithShape="0">
                       <a:schemeClr val="bg2">
@@ -13542,14 +13528,14 @@
             <a:effectLst/>
             <a:extLst>
               <a:ext uri="{909E8E84-426E-40dd-AFC4-6F175D3DCCD1}">
-                <a14:hiddenFill xmlns:a14="http://schemas.microsoft.com/office/drawing/2010/main" xmlns="">
+                <a14:hiddenFill xmlns="" xmlns:a14="http://schemas.microsoft.com/office/drawing/2010/main">
                   <a:solidFill>
                     <a:schemeClr val="accent1"/>
                   </a:solidFill>
                 </a14:hiddenFill>
               </a:ext>
               <a:ext uri="{AF507438-7753-43e0-B8FC-AC1667EBCBE1}">
-                <a14:hiddenEffects xmlns:a14="http://schemas.microsoft.com/office/drawing/2010/main" xmlns="">
+                <a14:hiddenEffects xmlns="" xmlns:a14="http://schemas.microsoft.com/office/drawing/2010/main">
                   <a:effectLst>
                     <a:outerShdw blurRad="63500" dist="38099" dir="2700000" algn="ctr" rotWithShape="0">
                       <a:schemeClr val="bg2">
@@ -13592,14 +13578,14 @@
             <a:effectLst/>
             <a:extLst>
               <a:ext uri="{909E8E84-426E-40dd-AFC4-6F175D3DCCD1}">
-                <a14:hiddenFill xmlns:a14="http://schemas.microsoft.com/office/drawing/2010/main" xmlns="">
+                <a14:hiddenFill xmlns="" xmlns:a14="http://schemas.microsoft.com/office/drawing/2010/main">
                   <a:solidFill>
                     <a:schemeClr val="accent1"/>
                   </a:solidFill>
                 </a14:hiddenFill>
               </a:ext>
               <a:ext uri="{91240B29-F687-4f45-9708-019B960494DF}">
-                <a14:hiddenLine xmlns:a14="http://schemas.microsoft.com/office/drawing/2010/main" xmlns="" w="9525">
+                <a14:hiddenLine xmlns="" xmlns:a14="http://schemas.microsoft.com/office/drawing/2010/main" w="9525">
                   <a:solidFill>
                     <a:schemeClr val="tx1"/>
                   </a:solidFill>
@@ -13609,7 +13595,7 @@
                 </a14:hiddenLine>
               </a:ext>
               <a:ext uri="{AF507438-7753-43e0-B8FC-AC1667EBCBE1}">
-                <a14:hiddenEffects xmlns:a14="http://schemas.microsoft.com/office/drawing/2010/main" xmlns="">
+                <a14:hiddenEffects xmlns="" xmlns:a14="http://schemas.microsoft.com/office/drawing/2010/main">
                   <a:effectLst>
                     <a:outerShdw blurRad="63500" dist="38099" dir="2700000" algn="ctr" rotWithShape="0">
                       <a:schemeClr val="bg2">
@@ -13668,14 +13654,14 @@
             <a:effectLst/>
             <a:extLst>
               <a:ext uri="{909E8E84-426E-40dd-AFC4-6F175D3DCCD1}">
-                <a14:hiddenFill xmlns:a14="http://schemas.microsoft.com/office/drawing/2010/main" xmlns="">
+                <a14:hiddenFill xmlns="" xmlns:a14="http://schemas.microsoft.com/office/drawing/2010/main">
                   <a:solidFill>
                     <a:schemeClr val="accent2"/>
                   </a:solidFill>
                 </a14:hiddenFill>
               </a:ext>
               <a:ext uri="{AF507438-7753-43e0-B8FC-AC1667EBCBE1}">
-                <a14:hiddenEffects xmlns:a14="http://schemas.microsoft.com/office/drawing/2010/main" xmlns="">
+                <a14:hiddenEffects xmlns="" xmlns:a14="http://schemas.microsoft.com/office/drawing/2010/main">
                   <a:effectLst>
                     <a:outerShdw blurRad="63500" dist="38099" dir="2700000" algn="ctr" rotWithShape="0">
                       <a:schemeClr val="bg2">
@@ -13718,14 +13704,14 @@
             <a:effectLst/>
             <a:extLst>
               <a:ext uri="{909E8E84-426E-40dd-AFC4-6F175D3DCCD1}">
-                <a14:hiddenFill xmlns:a14="http://schemas.microsoft.com/office/drawing/2010/main" xmlns="">
+                <a14:hiddenFill xmlns="" xmlns:a14="http://schemas.microsoft.com/office/drawing/2010/main">
                   <a:solidFill>
                     <a:schemeClr val="accent1"/>
                   </a:solidFill>
                 </a14:hiddenFill>
               </a:ext>
               <a:ext uri="{91240B29-F687-4f45-9708-019B960494DF}">
-                <a14:hiddenLine xmlns:a14="http://schemas.microsoft.com/office/drawing/2010/main" xmlns="" w="9525">
+                <a14:hiddenLine xmlns="" xmlns:a14="http://schemas.microsoft.com/office/drawing/2010/main" w="9525">
                   <a:solidFill>
                     <a:schemeClr val="tx1"/>
                   </a:solidFill>
@@ -13735,7 +13721,7 @@
                 </a14:hiddenLine>
               </a:ext>
               <a:ext uri="{AF507438-7753-43e0-B8FC-AC1667EBCBE1}">
-                <a14:hiddenEffects xmlns:a14="http://schemas.microsoft.com/office/drawing/2010/main" xmlns="">
+                <a14:hiddenEffects xmlns="" xmlns:a14="http://schemas.microsoft.com/office/drawing/2010/main">
                   <a:effectLst>
                     <a:outerShdw blurRad="63500" dist="38099" dir="2700000" algn="ctr" rotWithShape="0">
                       <a:schemeClr val="bg2">
@@ -13795,14 +13781,14 @@
             <a:effectLst/>
             <a:extLst>
               <a:ext uri="{909E8E84-426E-40dd-AFC4-6F175D3DCCD1}">
-                <a14:hiddenFill xmlns:a14="http://schemas.microsoft.com/office/drawing/2010/main" xmlns="">
+                <a14:hiddenFill xmlns="" xmlns:a14="http://schemas.microsoft.com/office/drawing/2010/main">
                   <a:solidFill>
                     <a:schemeClr val="accent1"/>
                   </a:solidFill>
                 </a14:hiddenFill>
               </a:ext>
               <a:ext uri="{91240B29-F687-4f45-9708-019B960494DF}">
-                <a14:hiddenLine xmlns:a14="http://schemas.microsoft.com/office/drawing/2010/main" xmlns="" w="9525">
+                <a14:hiddenLine xmlns="" xmlns:a14="http://schemas.microsoft.com/office/drawing/2010/main" w="9525">
                   <a:solidFill>
                     <a:schemeClr val="tx1"/>
                   </a:solidFill>
@@ -13812,7 +13798,7 @@
                 </a14:hiddenLine>
               </a:ext>
               <a:ext uri="{AF507438-7753-43e0-B8FC-AC1667EBCBE1}">
-                <a14:hiddenEffects xmlns:a14="http://schemas.microsoft.com/office/drawing/2010/main" xmlns="">
+                <a14:hiddenEffects xmlns="" xmlns:a14="http://schemas.microsoft.com/office/drawing/2010/main">
                   <a:effectLst>
                     <a:outerShdw blurRad="63500" dist="38099" dir="2700000" algn="ctr" rotWithShape="0">
                       <a:schemeClr val="bg2">
@@ -13890,7 +13876,7 @@
             <a:effectLst/>
             <a:extLst>
               <a:ext uri="{AF507438-7753-43e0-B8FC-AC1667EBCBE1}">
-                <a14:hiddenEffects xmlns:a14="http://schemas.microsoft.com/office/drawing/2010/main" xmlns="">
+                <a14:hiddenEffects xmlns="" xmlns:a14="http://schemas.microsoft.com/office/drawing/2010/main">
                   <a:effectLst>
                     <a:outerShdw blurRad="63500" dist="38099" dir="2700000" algn="ctr" rotWithShape="0">
                       <a:schemeClr val="bg2">
@@ -13943,7 +13929,7 @@
             <a:effectLst/>
             <a:extLst>
               <a:ext uri="{AF507438-7753-43e0-B8FC-AC1667EBCBE1}">
-                <a14:hiddenEffects xmlns:a14="http://schemas.microsoft.com/office/drawing/2010/main" xmlns="">
+                <a14:hiddenEffects xmlns="" xmlns:a14="http://schemas.microsoft.com/office/drawing/2010/main">
                   <a:effectLst>
                     <a:outerShdw blurRad="63500" dist="38099" dir="2700000" algn="ctr" rotWithShape="0">
                       <a:schemeClr val="bg2">
@@ -14042,7 +14028,7 @@
             <a:effectLst/>
             <a:extLst>
               <a:ext uri="{AF507438-7753-43e0-B8FC-AC1667EBCBE1}">
-                <a14:hiddenEffects xmlns:a14="http://schemas.microsoft.com/office/drawing/2010/main" xmlns="">
+                <a14:hiddenEffects xmlns="" xmlns:a14="http://schemas.microsoft.com/office/drawing/2010/main">
                   <a:effectLst>
                     <a:outerShdw blurRad="63500" dist="38099" dir="2700000" algn="ctr" rotWithShape="0">
                       <a:schemeClr val="bg2">
@@ -14130,7 +14116,7 @@
             <a:effectLst/>
             <a:extLst>
               <a:ext uri="{91240B29-F687-4f45-9708-019B960494DF}">
-                <a14:hiddenLine xmlns:a14="http://schemas.microsoft.com/office/drawing/2010/main" xmlns="" w="9525">
+                <a14:hiddenLine xmlns="" xmlns:a14="http://schemas.microsoft.com/office/drawing/2010/main" w="9525">
                   <a:solidFill>
                     <a:schemeClr val="tx1"/>
                   </a:solidFill>
@@ -14140,7 +14126,7 @@
                 </a14:hiddenLine>
               </a:ext>
               <a:ext uri="{AF507438-7753-43e0-B8FC-AC1667EBCBE1}">
-                <a14:hiddenEffects xmlns:a14="http://schemas.microsoft.com/office/drawing/2010/main" xmlns="">
+                <a14:hiddenEffects xmlns="" xmlns:a14="http://schemas.microsoft.com/office/drawing/2010/main">
                   <a:effectLst>
                     <a:outerShdw blurRad="63500" dist="38099" dir="2700000" algn="ctr" rotWithShape="0">
                       <a:schemeClr val="bg2">
@@ -14188,12 +14174,12 @@
             <a:effectLst/>
             <a:extLst>
               <a:ext uri="{909E8E84-426E-40dd-AFC4-6F175D3DCCD1}">
-                <a14:hiddenFill xmlns:a14="http://schemas.microsoft.com/office/drawing/2010/main" xmlns="">
+                <a14:hiddenFill xmlns="" xmlns:a14="http://schemas.microsoft.com/office/drawing/2010/main">
                   <a:noFill/>
                 </a14:hiddenFill>
               </a:ext>
               <a:ext uri="{AF507438-7753-43e0-B8FC-AC1667EBCBE1}">
-                <a14:hiddenEffects xmlns:a14="http://schemas.microsoft.com/office/drawing/2010/main" xmlns="">
+                <a14:hiddenEffects xmlns="" xmlns:a14="http://schemas.microsoft.com/office/drawing/2010/main">
                   <a:effectLst>
                     <a:outerShdw blurRad="63500" dist="38099" dir="2700000" algn="ctr" rotWithShape="0">
                       <a:schemeClr val="bg2">
@@ -14241,12 +14227,12 @@
             <a:effectLst/>
             <a:extLst>
               <a:ext uri="{909E8E84-426E-40dd-AFC4-6F175D3DCCD1}">
-                <a14:hiddenFill xmlns:a14="http://schemas.microsoft.com/office/drawing/2010/main" xmlns="">
+                <a14:hiddenFill xmlns="" xmlns:a14="http://schemas.microsoft.com/office/drawing/2010/main">
                   <a:noFill/>
                 </a14:hiddenFill>
               </a:ext>
               <a:ext uri="{AF507438-7753-43e0-B8FC-AC1667EBCBE1}">
-                <a14:hiddenEffects xmlns:a14="http://schemas.microsoft.com/office/drawing/2010/main" xmlns="">
+                <a14:hiddenEffects xmlns="" xmlns:a14="http://schemas.microsoft.com/office/drawing/2010/main">
                   <a:effectLst>
                     <a:outerShdw blurRad="63500" dist="38099" dir="2700000" algn="ctr" rotWithShape="0">
                       <a:schemeClr val="bg2">
@@ -14289,14 +14275,14 @@
             <a:effectLst/>
             <a:extLst>
               <a:ext uri="{909E8E84-426E-40dd-AFC4-6F175D3DCCD1}">
-                <a14:hiddenFill xmlns:a14="http://schemas.microsoft.com/office/drawing/2010/main" xmlns="">
+                <a14:hiddenFill xmlns="" xmlns:a14="http://schemas.microsoft.com/office/drawing/2010/main">
                   <a:solidFill>
                     <a:schemeClr val="accent1"/>
                   </a:solidFill>
                 </a14:hiddenFill>
               </a:ext>
               <a:ext uri="{91240B29-F687-4f45-9708-019B960494DF}">
-                <a14:hiddenLine xmlns:a14="http://schemas.microsoft.com/office/drawing/2010/main" xmlns="" w="9525">
+                <a14:hiddenLine xmlns="" xmlns:a14="http://schemas.microsoft.com/office/drawing/2010/main" w="9525">
                   <a:solidFill>
                     <a:schemeClr val="tx1"/>
                   </a:solidFill>
@@ -14306,7 +14292,7 @@
                 </a14:hiddenLine>
               </a:ext>
               <a:ext uri="{AF507438-7753-43e0-B8FC-AC1667EBCBE1}">
-                <a14:hiddenEffects xmlns:a14="http://schemas.microsoft.com/office/drawing/2010/main" xmlns="">
+                <a14:hiddenEffects xmlns="" xmlns:a14="http://schemas.microsoft.com/office/drawing/2010/main">
                   <a:effectLst>
                     <a:outerShdw blurRad="63500" dist="38099" dir="2700000" algn="ctr" rotWithShape="0">
                       <a:schemeClr val="bg2">
@@ -14360,14 +14346,14 @@
             <a:effectLst/>
             <a:extLst>
               <a:ext uri="{909E8E84-426E-40dd-AFC4-6F175D3DCCD1}">
-                <a14:hiddenFill xmlns:a14="http://schemas.microsoft.com/office/drawing/2010/main" xmlns="">
+                <a14:hiddenFill xmlns="" xmlns:a14="http://schemas.microsoft.com/office/drawing/2010/main">
                   <a:solidFill>
                     <a:schemeClr val="accent1"/>
                   </a:solidFill>
                 </a14:hiddenFill>
               </a:ext>
               <a:ext uri="{91240B29-F687-4f45-9708-019B960494DF}">
-                <a14:hiddenLine xmlns:a14="http://schemas.microsoft.com/office/drawing/2010/main" xmlns="" w="9525">
+                <a14:hiddenLine xmlns="" xmlns:a14="http://schemas.microsoft.com/office/drawing/2010/main" w="9525">
                   <a:solidFill>
                     <a:schemeClr val="tx1"/>
                   </a:solidFill>
@@ -14377,7 +14363,7 @@
                 </a14:hiddenLine>
               </a:ext>
               <a:ext uri="{AF507438-7753-43e0-B8FC-AC1667EBCBE1}">
-                <a14:hiddenEffects xmlns:a14="http://schemas.microsoft.com/office/drawing/2010/main" xmlns="">
+                <a14:hiddenEffects xmlns="" xmlns:a14="http://schemas.microsoft.com/office/drawing/2010/main">
                   <a:effectLst>
                     <a:outerShdw blurRad="63500" dist="38099" dir="2700000" algn="ctr" rotWithShape="0">
                       <a:schemeClr val="bg2">
@@ -14432,14 +14418,14 @@
           <a:effectLst/>
           <a:extLst>
             <a:ext uri="{909E8E84-426E-40dd-AFC4-6F175D3DCCD1}">
-              <a14:hiddenFill xmlns:a14="http://schemas.microsoft.com/office/drawing/2010/main" xmlns="">
+              <a14:hiddenFill xmlns="" xmlns:a14="http://schemas.microsoft.com/office/drawing/2010/main">
                 <a:solidFill>
                   <a:schemeClr val="accent1"/>
                 </a:solidFill>
               </a14:hiddenFill>
             </a:ext>
             <a:ext uri="{91240B29-F687-4f45-9708-019B960494DF}">
-              <a14:hiddenLine xmlns:a14="http://schemas.microsoft.com/office/drawing/2010/main" xmlns="" w="9525">
+              <a14:hiddenLine xmlns="" xmlns:a14="http://schemas.microsoft.com/office/drawing/2010/main" w="9525">
                 <a:solidFill>
                   <a:schemeClr val="tx1"/>
                 </a:solidFill>
@@ -14449,7 +14435,7 @@
               </a14:hiddenLine>
             </a:ext>
             <a:ext uri="{AF507438-7753-43e0-B8FC-AC1667EBCBE1}">
-              <a14:hiddenEffects xmlns:a14="http://schemas.microsoft.com/office/drawing/2010/main" xmlns="">
+              <a14:hiddenEffects xmlns="" xmlns:a14="http://schemas.microsoft.com/office/drawing/2010/main">
                 <a:effectLst>
                   <a:outerShdw blurRad="63500" dist="38099" dir="2700000" algn="ctr" rotWithShape="0">
                     <a:srgbClr val="000000">
@@ -14762,7 +14748,7 @@
             <a:effectLst/>
             <a:extLst>
               <a:ext uri="{AF507438-7753-43e0-B8FC-AC1667EBCBE1}">
-                <a14:hiddenEffects xmlns:a14="http://schemas.microsoft.com/office/drawing/2010/main" xmlns="">
+                <a14:hiddenEffects xmlns="" xmlns:a14="http://schemas.microsoft.com/office/drawing/2010/main">
                   <a:effectLst>
                     <a:outerShdw blurRad="63500" dist="38099" dir="2700000" algn="ctr" rotWithShape="0">
                       <a:schemeClr val="bg2">
@@ -14938,7 +14924,7 @@
             <a:effectLst/>
             <a:extLst>
               <a:ext uri="{91240B29-F687-4f45-9708-019B960494DF}">
-                <a14:hiddenLine xmlns:a14="http://schemas.microsoft.com/office/drawing/2010/main" xmlns="" w="9525">
+                <a14:hiddenLine xmlns="" xmlns:a14="http://schemas.microsoft.com/office/drawing/2010/main" w="9525">
                   <a:solidFill>
                     <a:schemeClr val="tx1"/>
                   </a:solidFill>
@@ -14948,7 +14934,7 @@
                 </a14:hiddenLine>
               </a:ext>
               <a:ext uri="{AF507438-7753-43e0-B8FC-AC1667EBCBE1}">
-                <a14:hiddenEffects xmlns:a14="http://schemas.microsoft.com/office/drawing/2010/main" xmlns="">
+                <a14:hiddenEffects xmlns="" xmlns:a14="http://schemas.microsoft.com/office/drawing/2010/main">
                   <a:effectLst>
                     <a:outerShdw blurRad="63500" dist="38099" dir="2700000" algn="ctr" rotWithShape="0">
                       <a:schemeClr val="bg2">
@@ -14991,14 +14977,14 @@
             <a:effectLst/>
             <a:extLst>
               <a:ext uri="{909E8E84-426E-40dd-AFC4-6F175D3DCCD1}">
-                <a14:hiddenFill xmlns:a14="http://schemas.microsoft.com/office/drawing/2010/main" xmlns="">
+                <a14:hiddenFill xmlns="" xmlns:a14="http://schemas.microsoft.com/office/drawing/2010/main">
                   <a:solidFill>
                     <a:schemeClr val="accent1"/>
                   </a:solidFill>
                 </a14:hiddenFill>
               </a:ext>
               <a:ext uri="{91240B29-F687-4f45-9708-019B960494DF}">
-                <a14:hiddenLine xmlns:a14="http://schemas.microsoft.com/office/drawing/2010/main" xmlns="" w="9525">
+                <a14:hiddenLine xmlns="" xmlns:a14="http://schemas.microsoft.com/office/drawing/2010/main" w="9525">
                   <a:solidFill>
                     <a:schemeClr val="tx1"/>
                   </a:solidFill>
@@ -15008,7 +14994,7 @@
                 </a14:hiddenLine>
               </a:ext>
               <a:ext uri="{AF507438-7753-43e0-B8FC-AC1667EBCBE1}">
-                <a14:hiddenEffects xmlns:a14="http://schemas.microsoft.com/office/drawing/2010/main" xmlns="">
+                <a14:hiddenEffects xmlns="" xmlns:a14="http://schemas.microsoft.com/office/drawing/2010/main">
                   <a:effectLst>
                     <a:outerShdw blurRad="63500" dist="38099" dir="2700000" algn="ctr" rotWithShape="0">
                       <a:schemeClr val="bg2">
@@ -15077,14 +15063,14 @@
             <a:effectLst/>
             <a:extLst>
               <a:ext uri="{909E8E84-426E-40dd-AFC4-6F175D3DCCD1}">
-                <a14:hiddenFill xmlns:a14="http://schemas.microsoft.com/office/drawing/2010/main" xmlns="">
+                <a14:hiddenFill xmlns="" xmlns:a14="http://schemas.microsoft.com/office/drawing/2010/main">
                   <a:solidFill>
                     <a:schemeClr val="accent1"/>
                   </a:solidFill>
                 </a14:hiddenFill>
               </a:ext>
               <a:ext uri="{91240B29-F687-4f45-9708-019B960494DF}">
-                <a14:hiddenLine xmlns:a14="http://schemas.microsoft.com/office/drawing/2010/main" xmlns="" w="9525">
+                <a14:hiddenLine xmlns="" xmlns:a14="http://schemas.microsoft.com/office/drawing/2010/main" w="9525">
                   <a:solidFill>
                     <a:schemeClr val="tx1"/>
                   </a:solidFill>
@@ -15094,7 +15080,7 @@
                 </a14:hiddenLine>
               </a:ext>
               <a:ext uri="{AF507438-7753-43e0-B8FC-AC1667EBCBE1}">
-                <a14:hiddenEffects xmlns:a14="http://schemas.microsoft.com/office/drawing/2010/main" xmlns="">
+                <a14:hiddenEffects xmlns="" xmlns:a14="http://schemas.microsoft.com/office/drawing/2010/main">
                   <a:effectLst>
                     <a:outerShdw blurRad="63500" dist="38099" dir="2700000" algn="ctr" rotWithShape="0">
                       <a:schemeClr val="bg2">
@@ -15163,14 +15149,14 @@
             <a:effectLst/>
             <a:extLst>
               <a:ext uri="{909E8E84-426E-40dd-AFC4-6F175D3DCCD1}">
-                <a14:hiddenFill xmlns:a14="http://schemas.microsoft.com/office/drawing/2010/main" xmlns="">
+                <a14:hiddenFill xmlns="" xmlns:a14="http://schemas.microsoft.com/office/drawing/2010/main">
                   <a:solidFill>
                     <a:schemeClr val="accent1"/>
                   </a:solidFill>
                 </a14:hiddenFill>
               </a:ext>
               <a:ext uri="{91240B29-F687-4f45-9708-019B960494DF}">
-                <a14:hiddenLine xmlns:a14="http://schemas.microsoft.com/office/drawing/2010/main" xmlns="" w="9525">
+                <a14:hiddenLine xmlns="" xmlns:a14="http://schemas.microsoft.com/office/drawing/2010/main" w="9525">
                   <a:solidFill>
                     <a:schemeClr val="tx1"/>
                   </a:solidFill>
@@ -15180,7 +15166,7 @@
                 </a14:hiddenLine>
               </a:ext>
               <a:ext uri="{AF507438-7753-43e0-B8FC-AC1667EBCBE1}">
-                <a14:hiddenEffects xmlns:a14="http://schemas.microsoft.com/office/drawing/2010/main" xmlns="">
+                <a14:hiddenEffects xmlns="" xmlns:a14="http://schemas.microsoft.com/office/drawing/2010/main">
                   <a:effectLst>
                     <a:outerShdw blurRad="63500" dist="38099" dir="2700000" algn="ctr" rotWithShape="0">
                       <a:schemeClr val="bg2">
@@ -15286,12 +15272,12 @@
                 <a:effectLst/>
                 <a:extLst>
                   <a:ext uri="{909E8E84-426E-40dd-AFC4-6F175D3DCCD1}">
-                    <a14:hiddenFill xmlns:a14="http://schemas.microsoft.com/office/drawing/2010/main" xmlns="">
+                    <a14:hiddenFill xmlns="" xmlns:a14="http://schemas.microsoft.com/office/drawing/2010/main">
                       <a:noFill/>
                     </a14:hiddenFill>
                   </a:ext>
                   <a:ext uri="{AF507438-7753-43e0-B8FC-AC1667EBCBE1}">
-                    <a14:hiddenEffects xmlns:a14="http://schemas.microsoft.com/office/drawing/2010/main" xmlns="">
+                    <a14:hiddenEffects xmlns="" xmlns:a14="http://schemas.microsoft.com/office/drawing/2010/main">
                       <a:effectLst>
                         <a:outerShdw blurRad="63500" dist="38099" dir="2700000" algn="ctr" rotWithShape="0">
                           <a:schemeClr val="bg2">
@@ -15339,12 +15325,12 @@
                 <a:effectLst/>
                 <a:extLst>
                   <a:ext uri="{909E8E84-426E-40dd-AFC4-6F175D3DCCD1}">
-                    <a14:hiddenFill xmlns:a14="http://schemas.microsoft.com/office/drawing/2010/main" xmlns="">
+                    <a14:hiddenFill xmlns="" xmlns:a14="http://schemas.microsoft.com/office/drawing/2010/main">
                       <a:noFill/>
                     </a14:hiddenFill>
                   </a:ext>
                   <a:ext uri="{AF507438-7753-43e0-B8FC-AC1667EBCBE1}">
-                    <a14:hiddenEffects xmlns:a14="http://schemas.microsoft.com/office/drawing/2010/main" xmlns="">
+                    <a14:hiddenEffects xmlns="" xmlns:a14="http://schemas.microsoft.com/office/drawing/2010/main">
                       <a:effectLst>
                         <a:outerShdw blurRad="63500" dist="38099" dir="2700000" algn="ctr" rotWithShape="0">
                           <a:schemeClr val="bg2">
@@ -15409,12 +15395,12 @@
                 <a:effectLst/>
                 <a:extLst>
                   <a:ext uri="{909E8E84-426E-40dd-AFC4-6F175D3DCCD1}">
-                    <a14:hiddenFill xmlns:a14="http://schemas.microsoft.com/office/drawing/2010/main" xmlns="">
+                    <a14:hiddenFill xmlns="" xmlns:a14="http://schemas.microsoft.com/office/drawing/2010/main">
                       <a:noFill/>
                     </a14:hiddenFill>
                   </a:ext>
                   <a:ext uri="{AF507438-7753-43e0-B8FC-AC1667EBCBE1}">
-                    <a14:hiddenEffects xmlns:a14="http://schemas.microsoft.com/office/drawing/2010/main" xmlns="">
+                    <a14:hiddenEffects xmlns="" xmlns:a14="http://schemas.microsoft.com/office/drawing/2010/main">
                       <a:effectLst>
                         <a:outerShdw blurRad="63500" dist="38099" dir="2700000" algn="ctr" rotWithShape="0">
                           <a:schemeClr val="bg2">
@@ -15462,12 +15448,12 @@
                 <a:effectLst/>
                 <a:extLst>
                   <a:ext uri="{909E8E84-426E-40dd-AFC4-6F175D3DCCD1}">
-                    <a14:hiddenFill xmlns:a14="http://schemas.microsoft.com/office/drawing/2010/main" xmlns="">
+                    <a14:hiddenFill xmlns="" xmlns:a14="http://schemas.microsoft.com/office/drawing/2010/main">
                       <a:noFill/>
                     </a14:hiddenFill>
                   </a:ext>
                   <a:ext uri="{AF507438-7753-43e0-B8FC-AC1667EBCBE1}">
-                    <a14:hiddenEffects xmlns:a14="http://schemas.microsoft.com/office/drawing/2010/main" xmlns="">
+                    <a14:hiddenEffects xmlns="" xmlns:a14="http://schemas.microsoft.com/office/drawing/2010/main">
                       <a:effectLst>
                         <a:outerShdw blurRad="63500" dist="38099" dir="2700000" algn="ctr" rotWithShape="0">
                           <a:schemeClr val="bg2">
@@ -15645,7 +15631,7 @@
             <a:effectLst/>
             <a:extLst>
               <a:ext uri="{91240B29-F687-4f45-9708-019B960494DF}">
-                <a14:hiddenLine xmlns:a14="http://schemas.microsoft.com/office/drawing/2010/main" xmlns="" w="9525">
+                <a14:hiddenLine xmlns="" xmlns:a14="http://schemas.microsoft.com/office/drawing/2010/main" w="9525">
                   <a:solidFill>
                     <a:schemeClr val="tx1"/>
                   </a:solidFill>
@@ -15655,7 +15641,7 @@
                 </a14:hiddenLine>
               </a:ext>
               <a:ext uri="{AF507438-7753-43e0-B8FC-AC1667EBCBE1}">
-                <a14:hiddenEffects xmlns:a14="http://schemas.microsoft.com/office/drawing/2010/main" xmlns="">
+                <a14:hiddenEffects xmlns="" xmlns:a14="http://schemas.microsoft.com/office/drawing/2010/main">
                   <a:effectLst>
                     <a:outerShdw blurRad="63500" dist="38099" dir="2700000" algn="ctr" rotWithShape="0">
                       <a:schemeClr val="bg2">
@@ -15698,14 +15684,14 @@
             <a:effectLst/>
             <a:extLst>
               <a:ext uri="{909E8E84-426E-40dd-AFC4-6F175D3DCCD1}">
-                <a14:hiddenFill xmlns:a14="http://schemas.microsoft.com/office/drawing/2010/main" xmlns="">
+                <a14:hiddenFill xmlns="" xmlns:a14="http://schemas.microsoft.com/office/drawing/2010/main">
                   <a:solidFill>
                     <a:schemeClr val="accent1"/>
                   </a:solidFill>
                 </a14:hiddenFill>
               </a:ext>
               <a:ext uri="{91240B29-F687-4f45-9708-019B960494DF}">
-                <a14:hiddenLine xmlns:a14="http://schemas.microsoft.com/office/drawing/2010/main" xmlns="" w="9525">
+                <a14:hiddenLine xmlns="" xmlns:a14="http://schemas.microsoft.com/office/drawing/2010/main" w="9525">
                   <a:solidFill>
                     <a:schemeClr val="tx1"/>
                   </a:solidFill>
@@ -15715,7 +15701,7 @@
                 </a14:hiddenLine>
               </a:ext>
               <a:ext uri="{AF507438-7753-43e0-B8FC-AC1667EBCBE1}">
-                <a14:hiddenEffects xmlns:a14="http://schemas.microsoft.com/office/drawing/2010/main" xmlns="">
+                <a14:hiddenEffects xmlns="" xmlns:a14="http://schemas.microsoft.com/office/drawing/2010/main">
                   <a:effectLst>
                     <a:outerShdw blurRad="63500" dist="38099" dir="2700000" algn="ctr" rotWithShape="0">
                       <a:schemeClr val="bg2">
@@ -15789,14 +15775,14 @@
             <a:effectLst/>
             <a:extLst>
               <a:ext uri="{909E8E84-426E-40dd-AFC4-6F175D3DCCD1}">
-                <a14:hiddenFill xmlns:a14="http://schemas.microsoft.com/office/drawing/2010/main" xmlns="">
+                <a14:hiddenFill xmlns="" xmlns:a14="http://schemas.microsoft.com/office/drawing/2010/main">
                   <a:solidFill>
                     <a:schemeClr val="accent1"/>
                   </a:solidFill>
                 </a14:hiddenFill>
               </a:ext>
               <a:ext uri="{AF507438-7753-43e0-B8FC-AC1667EBCBE1}">
-                <a14:hiddenEffects xmlns:a14="http://schemas.microsoft.com/office/drawing/2010/main" xmlns="">
+                <a14:hiddenEffects xmlns="" xmlns:a14="http://schemas.microsoft.com/office/drawing/2010/main">
                   <a:effectLst>
                     <a:outerShdw blurRad="63500" dist="38099" dir="2700000" algn="ctr" rotWithShape="0">
                       <a:schemeClr val="bg2">
@@ -15844,14 +15830,14 @@
             <a:effectLst/>
             <a:extLst>
               <a:ext uri="{909E8E84-426E-40dd-AFC4-6F175D3DCCD1}">
-                <a14:hiddenFill xmlns:a14="http://schemas.microsoft.com/office/drawing/2010/main" xmlns="">
+                <a14:hiddenFill xmlns="" xmlns:a14="http://schemas.microsoft.com/office/drawing/2010/main">
                   <a:solidFill>
                     <a:schemeClr val="accent1"/>
                   </a:solidFill>
                 </a14:hiddenFill>
               </a:ext>
               <a:ext uri="{AF507438-7753-43e0-B8FC-AC1667EBCBE1}">
-                <a14:hiddenEffects xmlns:a14="http://schemas.microsoft.com/office/drawing/2010/main" xmlns="">
+                <a14:hiddenEffects xmlns="" xmlns:a14="http://schemas.microsoft.com/office/drawing/2010/main">
                   <a:effectLst>
                     <a:outerShdw blurRad="63500" dist="38099" dir="2700000" algn="ctr" rotWithShape="0">
                       <a:schemeClr val="bg2">
@@ -15901,7 +15887,7 @@
             <a:effectLst/>
             <a:extLst>
               <a:ext uri="{AF507438-7753-43e0-B8FC-AC1667EBCBE1}">
-                <a14:hiddenEffects xmlns:a14="http://schemas.microsoft.com/office/drawing/2010/main" xmlns="">
+                <a14:hiddenEffects xmlns="" xmlns:a14="http://schemas.microsoft.com/office/drawing/2010/main">
                   <a:effectLst>
                     <a:outerShdw blurRad="63500" dist="38099" dir="2700000" algn="ctr" rotWithShape="0">
                       <a:schemeClr val="bg2">
@@ -17518,14 +17504,14 @@
           <a:effectLst/>
           <a:extLst>
             <a:ext uri="{909E8E84-426E-40dd-AFC4-6F175D3DCCD1}">
-              <a14:hiddenFill xmlns:a14="http://schemas.microsoft.com/office/drawing/2010/main" xmlns="">
+              <a14:hiddenFill xmlns="" xmlns:a14="http://schemas.microsoft.com/office/drawing/2010/main">
                 <a:solidFill>
                   <a:schemeClr val="accent1"/>
                 </a:solidFill>
               </a14:hiddenFill>
             </a:ext>
             <a:ext uri="{91240B29-F687-4f45-9708-019B960494DF}">
-              <a14:hiddenLine xmlns:a14="http://schemas.microsoft.com/office/drawing/2010/main" xmlns="" w="9525">
+              <a14:hiddenLine xmlns="" xmlns:a14="http://schemas.microsoft.com/office/drawing/2010/main" w="9525">
                 <a:solidFill>
                   <a:schemeClr val="tx1"/>
                 </a:solidFill>
@@ -17535,7 +17521,7 @@
               </a14:hiddenLine>
             </a:ext>
             <a:ext uri="{AF507438-7753-43e0-B8FC-AC1667EBCBE1}">
-              <a14:hiddenEffects xmlns:a14="http://schemas.microsoft.com/office/drawing/2010/main" xmlns="">
+              <a14:hiddenEffects xmlns="" xmlns:a14="http://schemas.microsoft.com/office/drawing/2010/main">
                 <a:effectLst>
                   <a:outerShdw blurRad="63500" dist="38099" dir="2700000" algn="ctr" rotWithShape="0">
                     <a:schemeClr val="bg2">
@@ -17636,7 +17622,7 @@
             <a:effectLst/>
             <a:extLst>
               <a:ext uri="{AF507438-7753-43e0-B8FC-AC1667EBCBE1}">
-                <a14:hiddenEffects xmlns:a14="http://schemas.microsoft.com/office/drawing/2010/main" xmlns="">
+                <a14:hiddenEffects xmlns="" xmlns:a14="http://schemas.microsoft.com/office/drawing/2010/main">
                   <a:effectLst>
                     <a:outerShdw blurRad="63500" dist="38099" dir="2700000" algn="ctr" rotWithShape="0">
                       <a:schemeClr val="bg2">
@@ -17812,7 +17798,7 @@
             <a:effectLst/>
             <a:extLst>
               <a:ext uri="{91240B29-F687-4f45-9708-019B960494DF}">
-                <a14:hiddenLine xmlns:a14="http://schemas.microsoft.com/office/drawing/2010/main" xmlns="" w="9525">
+                <a14:hiddenLine xmlns="" xmlns:a14="http://schemas.microsoft.com/office/drawing/2010/main" w="9525">
                   <a:solidFill>
                     <a:schemeClr val="tx1"/>
                   </a:solidFill>
@@ -17822,7 +17808,7 @@
                 </a14:hiddenLine>
               </a:ext>
               <a:ext uri="{AF507438-7753-43e0-B8FC-AC1667EBCBE1}">
-                <a14:hiddenEffects xmlns:a14="http://schemas.microsoft.com/office/drawing/2010/main" xmlns="">
+                <a14:hiddenEffects xmlns="" xmlns:a14="http://schemas.microsoft.com/office/drawing/2010/main">
                   <a:effectLst>
                     <a:outerShdw blurRad="63500" dist="38099" dir="2700000" algn="ctr" rotWithShape="0">
                       <a:schemeClr val="bg2">
@@ -17865,14 +17851,14 @@
             <a:effectLst/>
             <a:extLst>
               <a:ext uri="{909E8E84-426E-40dd-AFC4-6F175D3DCCD1}">
-                <a14:hiddenFill xmlns:a14="http://schemas.microsoft.com/office/drawing/2010/main" xmlns="">
+                <a14:hiddenFill xmlns="" xmlns:a14="http://schemas.microsoft.com/office/drawing/2010/main">
                   <a:solidFill>
                     <a:schemeClr val="accent1"/>
                   </a:solidFill>
                 </a14:hiddenFill>
               </a:ext>
               <a:ext uri="{91240B29-F687-4f45-9708-019B960494DF}">
-                <a14:hiddenLine xmlns:a14="http://schemas.microsoft.com/office/drawing/2010/main" xmlns="" w="9525">
+                <a14:hiddenLine xmlns="" xmlns:a14="http://schemas.microsoft.com/office/drawing/2010/main" w="9525">
                   <a:solidFill>
                     <a:schemeClr val="tx1"/>
                   </a:solidFill>
@@ -17882,7 +17868,7 @@
                 </a14:hiddenLine>
               </a:ext>
               <a:ext uri="{AF507438-7753-43e0-B8FC-AC1667EBCBE1}">
-                <a14:hiddenEffects xmlns:a14="http://schemas.microsoft.com/office/drawing/2010/main" xmlns="">
+                <a14:hiddenEffects xmlns="" xmlns:a14="http://schemas.microsoft.com/office/drawing/2010/main">
                   <a:effectLst>
                     <a:outerShdw blurRad="63500" dist="38099" dir="2700000" algn="ctr" rotWithShape="0">
                       <a:schemeClr val="bg2">
@@ -17951,14 +17937,14 @@
             <a:effectLst/>
             <a:extLst>
               <a:ext uri="{909E8E84-426E-40dd-AFC4-6F175D3DCCD1}">
-                <a14:hiddenFill xmlns:a14="http://schemas.microsoft.com/office/drawing/2010/main" xmlns="">
+                <a14:hiddenFill xmlns="" xmlns:a14="http://schemas.microsoft.com/office/drawing/2010/main">
                   <a:solidFill>
                     <a:schemeClr val="accent1"/>
                   </a:solidFill>
                 </a14:hiddenFill>
               </a:ext>
               <a:ext uri="{91240B29-F687-4f45-9708-019B960494DF}">
-                <a14:hiddenLine xmlns:a14="http://schemas.microsoft.com/office/drawing/2010/main" xmlns="" w="9525">
+                <a14:hiddenLine xmlns="" xmlns:a14="http://schemas.microsoft.com/office/drawing/2010/main" w="9525">
                   <a:solidFill>
                     <a:schemeClr val="tx1"/>
                   </a:solidFill>
@@ -17968,7 +17954,7 @@
                 </a14:hiddenLine>
               </a:ext>
               <a:ext uri="{AF507438-7753-43e0-B8FC-AC1667EBCBE1}">
-                <a14:hiddenEffects xmlns:a14="http://schemas.microsoft.com/office/drawing/2010/main" xmlns="">
+                <a14:hiddenEffects xmlns="" xmlns:a14="http://schemas.microsoft.com/office/drawing/2010/main">
                   <a:effectLst>
                     <a:outerShdw blurRad="63500" dist="38099" dir="2700000" algn="ctr" rotWithShape="0">
                       <a:schemeClr val="bg2">
@@ -18037,14 +18023,14 @@
             <a:effectLst/>
             <a:extLst>
               <a:ext uri="{909E8E84-426E-40dd-AFC4-6F175D3DCCD1}">
-                <a14:hiddenFill xmlns:a14="http://schemas.microsoft.com/office/drawing/2010/main" xmlns="">
+                <a14:hiddenFill xmlns="" xmlns:a14="http://schemas.microsoft.com/office/drawing/2010/main">
                   <a:solidFill>
                     <a:schemeClr val="accent1"/>
                   </a:solidFill>
                 </a14:hiddenFill>
               </a:ext>
               <a:ext uri="{91240B29-F687-4f45-9708-019B960494DF}">
-                <a14:hiddenLine xmlns:a14="http://schemas.microsoft.com/office/drawing/2010/main" xmlns="" w="9525">
+                <a14:hiddenLine xmlns="" xmlns:a14="http://schemas.microsoft.com/office/drawing/2010/main" w="9525">
                   <a:solidFill>
                     <a:schemeClr val="tx1"/>
                   </a:solidFill>
@@ -18054,7 +18040,7 @@
                 </a14:hiddenLine>
               </a:ext>
               <a:ext uri="{AF507438-7753-43e0-B8FC-AC1667EBCBE1}">
-                <a14:hiddenEffects xmlns:a14="http://schemas.microsoft.com/office/drawing/2010/main" xmlns="">
+                <a14:hiddenEffects xmlns="" xmlns:a14="http://schemas.microsoft.com/office/drawing/2010/main">
                   <a:effectLst>
                     <a:outerShdw blurRad="63500" dist="38099" dir="2700000" algn="ctr" rotWithShape="0">
                       <a:schemeClr val="bg2">
@@ -18160,12 +18146,12 @@
                 <a:effectLst/>
                 <a:extLst>
                   <a:ext uri="{909E8E84-426E-40dd-AFC4-6F175D3DCCD1}">
-                    <a14:hiddenFill xmlns:a14="http://schemas.microsoft.com/office/drawing/2010/main" xmlns="">
+                    <a14:hiddenFill xmlns="" xmlns:a14="http://schemas.microsoft.com/office/drawing/2010/main">
                       <a:noFill/>
                     </a14:hiddenFill>
                   </a:ext>
                   <a:ext uri="{AF507438-7753-43e0-B8FC-AC1667EBCBE1}">
-                    <a14:hiddenEffects xmlns:a14="http://schemas.microsoft.com/office/drawing/2010/main" xmlns="">
+                    <a14:hiddenEffects xmlns="" xmlns:a14="http://schemas.microsoft.com/office/drawing/2010/main">
                       <a:effectLst>
                         <a:outerShdw blurRad="63500" dist="38099" dir="2700000" algn="ctr" rotWithShape="0">
                           <a:schemeClr val="bg2">
@@ -18213,12 +18199,12 @@
                 <a:effectLst/>
                 <a:extLst>
                   <a:ext uri="{909E8E84-426E-40dd-AFC4-6F175D3DCCD1}">
-                    <a14:hiddenFill xmlns:a14="http://schemas.microsoft.com/office/drawing/2010/main" xmlns="">
+                    <a14:hiddenFill xmlns="" xmlns:a14="http://schemas.microsoft.com/office/drawing/2010/main">
                       <a:noFill/>
                     </a14:hiddenFill>
                   </a:ext>
                   <a:ext uri="{AF507438-7753-43e0-B8FC-AC1667EBCBE1}">
-                    <a14:hiddenEffects xmlns:a14="http://schemas.microsoft.com/office/drawing/2010/main" xmlns="">
+                    <a14:hiddenEffects xmlns="" xmlns:a14="http://schemas.microsoft.com/office/drawing/2010/main">
                       <a:effectLst>
                         <a:outerShdw blurRad="63500" dist="38099" dir="2700000" algn="ctr" rotWithShape="0">
                           <a:schemeClr val="bg2">
@@ -18283,12 +18269,12 @@
                 <a:effectLst/>
                 <a:extLst>
                   <a:ext uri="{909E8E84-426E-40dd-AFC4-6F175D3DCCD1}">
-                    <a14:hiddenFill xmlns:a14="http://schemas.microsoft.com/office/drawing/2010/main" xmlns="">
+                    <a14:hiddenFill xmlns="" xmlns:a14="http://schemas.microsoft.com/office/drawing/2010/main">
                       <a:noFill/>
                     </a14:hiddenFill>
                   </a:ext>
                   <a:ext uri="{AF507438-7753-43e0-B8FC-AC1667EBCBE1}">
-                    <a14:hiddenEffects xmlns:a14="http://schemas.microsoft.com/office/drawing/2010/main" xmlns="">
+                    <a14:hiddenEffects xmlns="" xmlns:a14="http://schemas.microsoft.com/office/drawing/2010/main">
                       <a:effectLst>
                         <a:outerShdw blurRad="63500" dist="38099" dir="2700000" algn="ctr" rotWithShape="0">
                           <a:schemeClr val="bg2">
@@ -18336,12 +18322,12 @@
                 <a:effectLst/>
                 <a:extLst>
                   <a:ext uri="{909E8E84-426E-40dd-AFC4-6F175D3DCCD1}">
-                    <a14:hiddenFill xmlns:a14="http://schemas.microsoft.com/office/drawing/2010/main" xmlns="">
+                    <a14:hiddenFill xmlns="" xmlns:a14="http://schemas.microsoft.com/office/drawing/2010/main">
                       <a:noFill/>
                     </a14:hiddenFill>
                   </a:ext>
                   <a:ext uri="{AF507438-7753-43e0-B8FC-AC1667EBCBE1}">
-                    <a14:hiddenEffects xmlns:a14="http://schemas.microsoft.com/office/drawing/2010/main" xmlns="">
+                    <a14:hiddenEffects xmlns="" xmlns:a14="http://schemas.microsoft.com/office/drawing/2010/main">
                       <a:effectLst>
                         <a:outerShdw blurRad="63500" dist="38099" dir="2700000" algn="ctr" rotWithShape="0">
                           <a:schemeClr val="bg2">
@@ -18519,7 +18505,7 @@
             <a:effectLst/>
             <a:extLst>
               <a:ext uri="{91240B29-F687-4f45-9708-019B960494DF}">
-                <a14:hiddenLine xmlns:a14="http://schemas.microsoft.com/office/drawing/2010/main" xmlns="" w="9525">
+                <a14:hiddenLine xmlns="" xmlns:a14="http://schemas.microsoft.com/office/drawing/2010/main" w="9525">
                   <a:solidFill>
                     <a:schemeClr val="tx1"/>
                   </a:solidFill>
@@ -18529,7 +18515,7 @@
                 </a14:hiddenLine>
               </a:ext>
               <a:ext uri="{AF507438-7753-43e0-B8FC-AC1667EBCBE1}">
-                <a14:hiddenEffects xmlns:a14="http://schemas.microsoft.com/office/drawing/2010/main" xmlns="">
+                <a14:hiddenEffects xmlns="" xmlns:a14="http://schemas.microsoft.com/office/drawing/2010/main">
                   <a:effectLst>
                     <a:outerShdw blurRad="63500" dist="38099" dir="2700000" algn="ctr" rotWithShape="0">
                       <a:schemeClr val="bg2">
@@ -18572,14 +18558,14 @@
             <a:effectLst/>
             <a:extLst>
               <a:ext uri="{909E8E84-426E-40dd-AFC4-6F175D3DCCD1}">
-                <a14:hiddenFill xmlns:a14="http://schemas.microsoft.com/office/drawing/2010/main" xmlns="">
+                <a14:hiddenFill xmlns="" xmlns:a14="http://schemas.microsoft.com/office/drawing/2010/main">
                   <a:solidFill>
                     <a:schemeClr val="accent1"/>
                   </a:solidFill>
                 </a14:hiddenFill>
               </a:ext>
               <a:ext uri="{91240B29-F687-4f45-9708-019B960494DF}">
-                <a14:hiddenLine xmlns:a14="http://schemas.microsoft.com/office/drawing/2010/main" xmlns="" w="9525">
+                <a14:hiddenLine xmlns="" xmlns:a14="http://schemas.microsoft.com/office/drawing/2010/main" w="9525">
                   <a:solidFill>
                     <a:schemeClr val="tx1"/>
                   </a:solidFill>
@@ -18589,7 +18575,7 @@
                 </a14:hiddenLine>
               </a:ext>
               <a:ext uri="{AF507438-7753-43e0-B8FC-AC1667EBCBE1}">
-                <a14:hiddenEffects xmlns:a14="http://schemas.microsoft.com/office/drawing/2010/main" xmlns="">
+                <a14:hiddenEffects xmlns="" xmlns:a14="http://schemas.microsoft.com/office/drawing/2010/main">
                   <a:effectLst>
                     <a:outerShdw blurRad="63500" dist="38099" dir="2700000" algn="ctr" rotWithShape="0">
                       <a:schemeClr val="bg2">
@@ -18663,14 +18649,14 @@
             <a:effectLst/>
             <a:extLst>
               <a:ext uri="{909E8E84-426E-40dd-AFC4-6F175D3DCCD1}">
-                <a14:hiddenFill xmlns:a14="http://schemas.microsoft.com/office/drawing/2010/main" xmlns="">
+                <a14:hiddenFill xmlns="" xmlns:a14="http://schemas.microsoft.com/office/drawing/2010/main">
                   <a:solidFill>
                     <a:schemeClr val="accent1"/>
                   </a:solidFill>
                 </a14:hiddenFill>
               </a:ext>
               <a:ext uri="{AF507438-7753-43e0-B8FC-AC1667EBCBE1}">
-                <a14:hiddenEffects xmlns:a14="http://schemas.microsoft.com/office/drawing/2010/main" xmlns="">
+                <a14:hiddenEffects xmlns="" xmlns:a14="http://schemas.microsoft.com/office/drawing/2010/main">
                   <a:effectLst>
                     <a:outerShdw blurRad="63500" dist="38099" dir="2700000" algn="ctr" rotWithShape="0">
                       <a:schemeClr val="bg2">
@@ -18718,14 +18704,14 @@
             <a:effectLst/>
             <a:extLst>
               <a:ext uri="{909E8E84-426E-40dd-AFC4-6F175D3DCCD1}">
-                <a14:hiddenFill xmlns:a14="http://schemas.microsoft.com/office/drawing/2010/main" xmlns="">
+                <a14:hiddenFill xmlns="" xmlns:a14="http://schemas.microsoft.com/office/drawing/2010/main">
                   <a:solidFill>
                     <a:schemeClr val="accent1"/>
                   </a:solidFill>
                 </a14:hiddenFill>
               </a:ext>
               <a:ext uri="{AF507438-7753-43e0-B8FC-AC1667EBCBE1}">
-                <a14:hiddenEffects xmlns:a14="http://schemas.microsoft.com/office/drawing/2010/main" xmlns="">
+                <a14:hiddenEffects xmlns="" xmlns:a14="http://schemas.microsoft.com/office/drawing/2010/main">
                   <a:effectLst>
                     <a:outerShdw blurRad="63500" dist="38099" dir="2700000" algn="ctr" rotWithShape="0">
                       <a:schemeClr val="bg2">
@@ -18775,7 +18761,7 @@
             <a:effectLst/>
             <a:extLst>
               <a:ext uri="{AF507438-7753-43e0-B8FC-AC1667EBCBE1}">
-                <a14:hiddenEffects xmlns:a14="http://schemas.microsoft.com/office/drawing/2010/main" xmlns="">
+                <a14:hiddenEffects xmlns="" xmlns:a14="http://schemas.microsoft.com/office/drawing/2010/main">
                   <a:effectLst>
                     <a:outerShdw blurRad="63500" dist="38099" dir="2700000" algn="ctr" rotWithShape="0">
                       <a:schemeClr val="bg2">
@@ -19607,13 +19593,39 @@
 </file>
 
 <file path=customXml/itemProps1.xml><?xml version="1.0" encoding="utf-8"?>
-<ds:datastoreItem xmlns:ds="http://schemas.openxmlformats.org/officeDocument/2006/customXml" ds:itemID="{1743B515-4B12-4505-81AB-0AF95DCADA6B}"/>
+<ds:datastoreItem xmlns:ds="http://schemas.openxmlformats.org/officeDocument/2006/customXml" ds:itemID="{1743B515-4B12-4505-81AB-0AF95DCADA6B}">
+  <ds:schemaRefs>
+    <ds:schemaRef ds:uri="http://schemas.microsoft.com/sharepoint/v3/contenttype/forms"/>
+  </ds:schemaRefs>
+</ds:datastoreItem>
 </file>
 
 <file path=customXml/itemProps2.xml><?xml version="1.0" encoding="utf-8"?>
-<ds:datastoreItem xmlns:ds="http://schemas.openxmlformats.org/officeDocument/2006/customXml" ds:itemID="{5FEF50D1-E5BD-42D2-A7A7-1091929D1917}"/>
+<ds:datastoreItem xmlns:ds="http://schemas.openxmlformats.org/officeDocument/2006/customXml" ds:itemID="{5FEF50D1-E5BD-42D2-A7A7-1091929D1917}">
+  <ds:schemaRefs>
+    <ds:schemaRef ds:uri="http://schemas.microsoft.com/office/2006/metadata/contentType"/>
+    <ds:schemaRef ds:uri="http://schemas.microsoft.com/office/2006/metadata/properties/metaAttributes"/>
+    <ds:schemaRef ds:uri="http://www.w3.org/2001/XMLSchema"/>
+    <ds:schemaRef ds:uri="http://schemas.microsoft.com/office/2006/metadata/properties"/>
+    <ds:schemaRef ds:uri="aea9341d-4472-4e5a-bcb6-dd249596582f"/>
+    <ds:schemaRef ds:uri="8633f2da-caf8-459e-97f2-6226df377df0"/>
+    <ds:schemaRef ds:uri="http://schemas.microsoft.com/office/2006/documentManagement/types"/>
+    <ds:schemaRef ds:uri="http://schemas.microsoft.com/office/infopath/2007/PartnerControls"/>
+    <ds:schemaRef ds:uri="http://schemas.openxmlformats.org/package/2006/metadata/core-properties"/>
+    <ds:schemaRef ds:uri="http://purl.org/dc/elements/1.1/"/>
+    <ds:schemaRef ds:uri="http://purl.org/dc/terms/"/>
+    <ds:schemaRef ds:uri="http://schemas.microsoft.com/internal/obd"/>
+  </ds:schemaRefs>
+</ds:datastoreItem>
 </file>
 
 <file path=customXml/itemProps3.xml><?xml version="1.0" encoding="utf-8"?>
-<ds:datastoreItem xmlns:ds="http://schemas.openxmlformats.org/officeDocument/2006/customXml" ds:itemID="{F3890C55-E5FF-4F6D-96DA-4B2939743904}"/>
+<ds:datastoreItem xmlns:ds="http://schemas.openxmlformats.org/officeDocument/2006/customXml" ds:itemID="{F3890C55-E5FF-4F6D-96DA-4B2939743904}">
+  <ds:schemaRefs>
+    <ds:schemaRef ds:uri="http://schemas.microsoft.com/office/2006/metadata/properties"/>
+    <ds:schemaRef ds:uri="http://schemas.microsoft.com/office/infopath/2007/PartnerControls"/>
+    <ds:schemaRef ds:uri="aea9341d-4472-4e5a-bcb6-dd249596582f"/>
+    <ds:schemaRef ds:uri="8633f2da-caf8-459e-97f2-6226df377df0"/>
+  </ds:schemaRefs>
+</ds:datastoreItem>
 </file>
</xml_diff>